<commit_message>
Updated legend: use distance in meters from L1 to L2 as reference
</commit_message>
<xml_diff>
--- a/XPlanningEvaluation/data/legend.pptx
+++ b/XPlanningEvaluation/data/legend.pptx
@@ -6,7 +6,8 @@
   </p:sldMasterIdLst>
   <p:sldIdLst>
     <p:sldId id="258" r:id="rId2"/>
-    <p:sldId id="259" r:id="rId3"/>
+    <p:sldId id="260" r:id="rId3"/>
+    <p:sldId id="259" r:id="rId4"/>
   </p:sldIdLst>
   <p:sldSz cx="13542963" cy="28601988"/>
   <p:notesSz cx="6858000" cy="9144000"/>
@@ -2956,6 +2957,2582 @@
 </file>
 
 <file path=ppt/slides/slide1.xml><?xml version="1.0" encoding="utf-8"?>
+<p:sld xmlns:a="http://schemas.openxmlformats.org/drawingml/2006/main" xmlns:r="http://schemas.openxmlformats.org/officeDocument/2006/relationships" xmlns:p="http://schemas.openxmlformats.org/presentationml/2006/main">
+  <p:cSld>
+    <p:spTree>
+      <p:nvGrpSpPr>
+        <p:cNvPr id="1" name=""/>
+        <p:cNvGrpSpPr/>
+        <p:nvPr/>
+      </p:nvGrpSpPr>
+      <p:grpSpPr>
+        <a:xfrm>
+          <a:off x="0" y="0"/>
+          <a:ext cx="0" cy="0"/>
+          <a:chOff x="0" y="0"/>
+          <a:chExt cx="0" cy="0"/>
+        </a:xfrm>
+      </p:grpSpPr>
+      <p:sp>
+        <p:nvSpPr>
+          <p:cNvPr id="2" name="Rectangle 1">
+            <a:extLst>
+              <a:ext uri="{FF2B5EF4-FFF2-40B4-BE49-F238E27FC236}">
+                <a16:creationId xmlns:a16="http://schemas.microsoft.com/office/drawing/2014/main" id="{64583B6D-3991-2B4B-9A6D-D0D17EB07DCF}"/>
+              </a:ext>
+            </a:extLst>
+          </p:cNvPr>
+          <p:cNvSpPr/>
+          <p:nvPr/>
+        </p:nvSpPr>
+        <p:spPr>
+          <a:xfrm>
+            <a:off x="8211" y="14933069"/>
+            <a:ext cx="8022606" cy="13668918"/>
+          </a:xfrm>
+          <a:prstGeom prst="rect">
+            <a:avLst/>
+          </a:prstGeom>
+          <a:noFill/>
+        </p:spPr>
+        <p:style>
+          <a:lnRef idx="2">
+            <a:schemeClr val="accent1">
+              <a:shade val="50000"/>
+            </a:schemeClr>
+          </a:lnRef>
+          <a:fillRef idx="1">
+            <a:schemeClr val="accent1"/>
+          </a:fillRef>
+          <a:effectRef idx="0">
+            <a:schemeClr val="accent1"/>
+          </a:effectRef>
+          <a:fontRef idx="minor">
+            <a:schemeClr val="lt1"/>
+          </a:fontRef>
+        </p:style>
+        <p:txBody>
+          <a:bodyPr rtlCol="0" anchor="ctr"/>
+          <a:lstStyle/>
+          <a:p>
+            <a:pPr algn="ctr"/>
+            <a:endParaRPr lang="en-US" sz="9783"/>
+          </a:p>
+        </p:txBody>
+      </p:sp>
+      <p:grpSp>
+        <p:nvGrpSpPr>
+          <p:cNvPr id="11" name="Group 10">
+            <a:extLst>
+              <a:ext uri="{FF2B5EF4-FFF2-40B4-BE49-F238E27FC236}">
+                <a16:creationId xmlns:a16="http://schemas.microsoft.com/office/drawing/2014/main" id="{52F50F4B-2000-5B45-A54D-06E44ED893B4}"/>
+              </a:ext>
+            </a:extLst>
+          </p:cNvPr>
+          <p:cNvGrpSpPr/>
+          <p:nvPr/>
+        </p:nvGrpSpPr>
+        <p:grpSpPr>
+          <a:xfrm>
+            <a:off x="661428" y="1664403"/>
+            <a:ext cx="4989017" cy="2902172"/>
+            <a:chOff x="661428" y="1239157"/>
+            <a:chExt cx="4989017" cy="2902172"/>
+          </a:xfrm>
+        </p:grpSpPr>
+        <p:grpSp>
+          <p:nvGrpSpPr>
+            <p:cNvPr id="5" name="Group 4">
+              <a:extLst>
+                <a:ext uri="{FF2B5EF4-FFF2-40B4-BE49-F238E27FC236}">
+                  <a16:creationId xmlns:a16="http://schemas.microsoft.com/office/drawing/2014/main" id="{962D6F91-0C39-B347-86AE-278632C7DD5A}"/>
+                </a:ext>
+              </a:extLst>
+            </p:cNvPr>
+            <p:cNvGrpSpPr/>
+            <p:nvPr/>
+          </p:nvGrpSpPr>
+          <p:grpSpPr>
+            <a:xfrm>
+              <a:off x="661428" y="1239157"/>
+              <a:ext cx="3620181" cy="731520"/>
+              <a:chOff x="661429" y="958533"/>
+              <a:chExt cx="3620181" cy="731520"/>
+            </a:xfrm>
+          </p:grpSpPr>
+          <p:sp>
+            <p:nvSpPr>
+              <p:cNvPr id="3" name="Oval 2">
+                <a:extLst>
+                  <a:ext uri="{FF2B5EF4-FFF2-40B4-BE49-F238E27FC236}">
+                    <a16:creationId xmlns:a16="http://schemas.microsoft.com/office/drawing/2014/main" id="{D447D82F-636C-D349-BCDD-22D96E8CA9B7}"/>
+                  </a:ext>
+                </a:extLst>
+              </p:cNvPr>
+              <p:cNvSpPr>
+                <a:spLocks noChangeAspect="1"/>
+              </p:cNvSpPr>
+              <p:nvPr/>
+            </p:nvSpPr>
+            <p:spPr>
+              <a:xfrm>
+                <a:off x="661429" y="958533"/>
+                <a:ext cx="731506" cy="731520"/>
+              </a:xfrm>
+              <a:prstGeom prst="ellipse">
+                <a:avLst/>
+              </a:prstGeom>
+              <a:solidFill>
+                <a:srgbClr val="00B050"/>
+              </a:solidFill>
+              <a:ln>
+                <a:solidFill>
+                  <a:schemeClr val="tx1"/>
+                </a:solidFill>
+              </a:ln>
+            </p:spPr>
+            <p:style>
+              <a:lnRef idx="2">
+                <a:schemeClr val="accent1">
+                  <a:shade val="50000"/>
+                </a:schemeClr>
+              </a:lnRef>
+              <a:fillRef idx="1">
+                <a:schemeClr val="accent1"/>
+              </a:fillRef>
+              <a:effectRef idx="0">
+                <a:schemeClr val="accent1"/>
+              </a:effectRef>
+              <a:fontRef idx="minor">
+                <a:schemeClr val="lt1"/>
+              </a:fontRef>
+            </p:style>
+            <p:txBody>
+              <a:bodyPr rtlCol="0" anchor="ctr"/>
+              <a:lstStyle/>
+              <a:p>
+                <a:pPr algn="ctr"/>
+                <a:endParaRPr lang="en-US" sz="9783" dirty="0"/>
+              </a:p>
+            </p:txBody>
+          </p:sp>
+          <p:sp>
+            <p:nvSpPr>
+              <p:cNvPr id="4" name="TextBox 3">
+                <a:extLst>
+                  <a:ext uri="{FF2B5EF4-FFF2-40B4-BE49-F238E27FC236}">
+                    <a16:creationId xmlns:a16="http://schemas.microsoft.com/office/drawing/2014/main" id="{D26F9AEC-0D88-B34D-83B3-683AEBA7F8FF}"/>
+                  </a:ext>
+                </a:extLst>
+              </p:cNvPr>
+              <p:cNvSpPr txBox="1"/>
+              <p:nvPr/>
+            </p:nvSpPr>
+            <p:spPr>
+              <a:xfrm>
+                <a:off x="1758483" y="970350"/>
+                <a:ext cx="2523127" cy="707886"/>
+              </a:xfrm>
+              <a:prstGeom prst="rect">
+                <a:avLst/>
+              </a:prstGeom>
+              <a:noFill/>
+            </p:spPr>
+            <p:txBody>
+              <a:bodyPr wrap="none" rtlCol="0">
+                <a:spAutoFit/>
+              </a:bodyPr>
+              <a:lstStyle/>
+              <a:p>
+                <a:r>
+                  <a:rPr lang="en-US" sz="4000" dirty="0"/>
+                  <a:t>Public Area</a:t>
+                </a:r>
+              </a:p>
+            </p:txBody>
+          </p:sp>
+        </p:grpSp>
+        <p:grpSp>
+          <p:nvGrpSpPr>
+            <p:cNvPr id="6" name="Group 5">
+              <a:extLst>
+                <a:ext uri="{FF2B5EF4-FFF2-40B4-BE49-F238E27FC236}">
+                  <a16:creationId xmlns:a16="http://schemas.microsoft.com/office/drawing/2014/main" id="{6A6BC4F0-C920-9748-9A19-074AE6F52315}"/>
+                </a:ext>
+              </a:extLst>
+            </p:cNvPr>
+            <p:cNvGrpSpPr/>
+            <p:nvPr/>
+          </p:nvGrpSpPr>
+          <p:grpSpPr>
+            <a:xfrm>
+              <a:off x="661429" y="2324483"/>
+              <a:ext cx="4989016" cy="731520"/>
+              <a:chOff x="661429" y="2166735"/>
+              <a:chExt cx="4989016" cy="731520"/>
+            </a:xfrm>
+          </p:grpSpPr>
+          <p:sp>
+            <p:nvSpPr>
+              <p:cNvPr id="9" name="Oval 8">
+                <a:extLst>
+                  <a:ext uri="{FF2B5EF4-FFF2-40B4-BE49-F238E27FC236}">
+                    <a16:creationId xmlns:a16="http://schemas.microsoft.com/office/drawing/2014/main" id="{BE653EEC-B5B8-4544-B934-BD570A7371D1}"/>
+                  </a:ext>
+                </a:extLst>
+              </p:cNvPr>
+              <p:cNvSpPr>
+                <a:spLocks noChangeAspect="1"/>
+              </p:cNvSpPr>
+              <p:nvPr/>
+            </p:nvSpPr>
+            <p:spPr>
+              <a:xfrm>
+                <a:off x="661429" y="2166735"/>
+                <a:ext cx="731520" cy="731520"/>
+              </a:xfrm>
+              <a:prstGeom prst="ellipse">
+                <a:avLst/>
+              </a:prstGeom>
+              <a:solidFill>
+                <a:srgbClr val="FFFF00"/>
+              </a:solidFill>
+              <a:ln>
+                <a:solidFill>
+                  <a:schemeClr val="tx1"/>
+                </a:solidFill>
+              </a:ln>
+            </p:spPr>
+            <p:style>
+              <a:lnRef idx="2">
+                <a:schemeClr val="accent1">
+                  <a:shade val="50000"/>
+                </a:schemeClr>
+              </a:lnRef>
+              <a:fillRef idx="1">
+                <a:schemeClr val="accent1"/>
+              </a:fillRef>
+              <a:effectRef idx="0">
+                <a:schemeClr val="accent1"/>
+              </a:effectRef>
+              <a:fontRef idx="minor">
+                <a:schemeClr val="lt1"/>
+              </a:fontRef>
+            </p:style>
+            <p:txBody>
+              <a:bodyPr rtlCol="0" anchor="ctr"/>
+              <a:lstStyle/>
+              <a:p>
+                <a:pPr algn="ctr"/>
+                <a:endParaRPr lang="en-US" sz="9783"/>
+              </a:p>
+            </p:txBody>
+          </p:sp>
+          <p:sp>
+            <p:nvSpPr>
+              <p:cNvPr id="10" name="TextBox 9">
+                <a:extLst>
+                  <a:ext uri="{FF2B5EF4-FFF2-40B4-BE49-F238E27FC236}">
+                    <a16:creationId xmlns:a16="http://schemas.microsoft.com/office/drawing/2014/main" id="{852AB541-31AE-4643-B6E7-772A973547DE}"/>
+                  </a:ext>
+                </a:extLst>
+              </p:cNvPr>
+              <p:cNvSpPr txBox="1"/>
+              <p:nvPr/>
+            </p:nvSpPr>
+            <p:spPr>
+              <a:xfrm>
+                <a:off x="1758482" y="2178552"/>
+                <a:ext cx="3891963" cy="707886"/>
+              </a:xfrm>
+              <a:prstGeom prst="rect">
+                <a:avLst/>
+              </a:prstGeom>
+              <a:noFill/>
+            </p:spPr>
+            <p:txBody>
+              <a:bodyPr wrap="none" rtlCol="0">
+                <a:spAutoFit/>
+              </a:bodyPr>
+              <a:lstStyle/>
+              <a:p>
+                <a:r>
+                  <a:rPr lang="en-US" sz="4000" dirty="0"/>
+                  <a:t>Semi-Private Area</a:t>
+                </a:r>
+              </a:p>
+            </p:txBody>
+          </p:sp>
+        </p:grpSp>
+        <p:grpSp>
+          <p:nvGrpSpPr>
+            <p:cNvPr id="7" name="Group 6">
+              <a:extLst>
+                <a:ext uri="{FF2B5EF4-FFF2-40B4-BE49-F238E27FC236}">
+                  <a16:creationId xmlns:a16="http://schemas.microsoft.com/office/drawing/2014/main" id="{0DCA9400-8AED-1E47-BE98-895903D407EA}"/>
+                </a:ext>
+              </a:extLst>
+            </p:cNvPr>
+            <p:cNvGrpSpPr/>
+            <p:nvPr/>
+          </p:nvGrpSpPr>
+          <p:grpSpPr>
+            <a:xfrm>
+              <a:off x="661428" y="3409809"/>
+              <a:ext cx="3814016" cy="731520"/>
+              <a:chOff x="661428" y="3269591"/>
+              <a:chExt cx="3814016" cy="731520"/>
+            </a:xfrm>
+          </p:grpSpPr>
+          <p:sp>
+            <p:nvSpPr>
+              <p:cNvPr id="13" name="Oval 12">
+                <a:extLst>
+                  <a:ext uri="{FF2B5EF4-FFF2-40B4-BE49-F238E27FC236}">
+                    <a16:creationId xmlns:a16="http://schemas.microsoft.com/office/drawing/2014/main" id="{04F9B7D6-A81C-644B-A405-69FECF56EABB}"/>
+                  </a:ext>
+                </a:extLst>
+              </p:cNvPr>
+              <p:cNvSpPr>
+                <a:spLocks noChangeAspect="1"/>
+              </p:cNvSpPr>
+              <p:nvPr/>
+            </p:nvSpPr>
+            <p:spPr>
+              <a:xfrm>
+                <a:off x="661428" y="3269591"/>
+                <a:ext cx="731513" cy="731520"/>
+              </a:xfrm>
+              <a:prstGeom prst="ellipse">
+                <a:avLst/>
+              </a:prstGeom>
+              <a:solidFill>
+                <a:srgbClr val="FF0000"/>
+              </a:solidFill>
+              <a:ln>
+                <a:solidFill>
+                  <a:schemeClr val="tx1"/>
+                </a:solidFill>
+              </a:ln>
+            </p:spPr>
+            <p:style>
+              <a:lnRef idx="2">
+                <a:schemeClr val="accent1">
+                  <a:shade val="50000"/>
+                </a:schemeClr>
+              </a:lnRef>
+              <a:fillRef idx="1">
+                <a:schemeClr val="accent1"/>
+              </a:fillRef>
+              <a:effectRef idx="0">
+                <a:schemeClr val="accent1"/>
+              </a:effectRef>
+              <a:fontRef idx="minor">
+                <a:schemeClr val="lt1"/>
+              </a:fontRef>
+            </p:style>
+            <p:txBody>
+              <a:bodyPr rtlCol="0" anchor="ctr"/>
+              <a:lstStyle/>
+              <a:p>
+                <a:pPr algn="ctr"/>
+                <a:endParaRPr lang="en-US" sz="9783"/>
+              </a:p>
+            </p:txBody>
+          </p:sp>
+          <p:sp>
+            <p:nvSpPr>
+              <p:cNvPr id="14" name="TextBox 13">
+                <a:extLst>
+                  <a:ext uri="{FF2B5EF4-FFF2-40B4-BE49-F238E27FC236}">
+                    <a16:creationId xmlns:a16="http://schemas.microsoft.com/office/drawing/2014/main" id="{9D9A374A-20DF-6944-87E2-C05DD4F357A5}"/>
+                  </a:ext>
+                </a:extLst>
+              </p:cNvPr>
+              <p:cNvSpPr txBox="1"/>
+              <p:nvPr/>
+            </p:nvSpPr>
+            <p:spPr>
+              <a:xfrm>
+                <a:off x="1758482" y="3281408"/>
+                <a:ext cx="2716962" cy="707886"/>
+              </a:xfrm>
+              <a:prstGeom prst="rect">
+                <a:avLst/>
+              </a:prstGeom>
+              <a:noFill/>
+            </p:spPr>
+            <p:txBody>
+              <a:bodyPr wrap="none" rtlCol="0">
+                <a:spAutoFit/>
+              </a:bodyPr>
+              <a:lstStyle/>
+              <a:p>
+                <a:r>
+                  <a:rPr lang="en-US" sz="4000" dirty="0"/>
+                  <a:t>Private Area</a:t>
+                </a:r>
+              </a:p>
+            </p:txBody>
+          </p:sp>
+        </p:grpSp>
+      </p:grpSp>
+      <p:grpSp>
+        <p:nvGrpSpPr>
+          <p:cNvPr id="21" name="Group 20">
+            <a:extLst>
+              <a:ext uri="{FF2B5EF4-FFF2-40B4-BE49-F238E27FC236}">
+                <a16:creationId xmlns:a16="http://schemas.microsoft.com/office/drawing/2014/main" id="{10A71193-0625-5142-9788-8B22AA2ACA01}"/>
+              </a:ext>
+            </a:extLst>
+          </p:cNvPr>
+          <p:cNvGrpSpPr/>
+          <p:nvPr/>
+        </p:nvGrpSpPr>
+        <p:grpSpPr>
+          <a:xfrm>
+            <a:off x="403017" y="5367669"/>
+            <a:ext cx="8607363" cy="2349704"/>
+            <a:chOff x="403017" y="5170746"/>
+            <a:chExt cx="8607363" cy="2349704"/>
+          </a:xfrm>
+        </p:grpSpPr>
+        <p:grpSp>
+          <p:nvGrpSpPr>
+            <p:cNvPr id="19" name="Group 18">
+              <a:extLst>
+                <a:ext uri="{FF2B5EF4-FFF2-40B4-BE49-F238E27FC236}">
+                  <a16:creationId xmlns:a16="http://schemas.microsoft.com/office/drawing/2014/main" id="{64908923-45EA-E44E-BBD4-7E72203626DE}"/>
+                </a:ext>
+              </a:extLst>
+            </p:cNvPr>
+            <p:cNvGrpSpPr/>
+            <p:nvPr/>
+          </p:nvGrpSpPr>
+          <p:grpSpPr>
+            <a:xfrm>
+              <a:off x="403023" y="5170746"/>
+              <a:ext cx="8607357" cy="707885"/>
+              <a:chOff x="403023" y="5813143"/>
+              <a:chExt cx="8607357" cy="707885"/>
+            </a:xfrm>
+          </p:grpSpPr>
+          <p:grpSp>
+            <p:nvGrpSpPr>
+              <p:cNvPr id="12" name="Group 11">
+                <a:extLst>
+                  <a:ext uri="{FF2B5EF4-FFF2-40B4-BE49-F238E27FC236}">
+                    <a16:creationId xmlns:a16="http://schemas.microsoft.com/office/drawing/2014/main" id="{97C23E50-D35D-3040-A51C-E0B2E5929E95}"/>
+                  </a:ext>
+                </a:extLst>
+              </p:cNvPr>
+              <p:cNvGrpSpPr/>
+              <p:nvPr/>
+            </p:nvGrpSpPr>
+            <p:grpSpPr>
+              <a:xfrm>
+                <a:off x="403023" y="5813143"/>
+                <a:ext cx="2242632" cy="707885"/>
+                <a:chOff x="403023" y="5786717"/>
+                <a:chExt cx="2242632" cy="707885"/>
+              </a:xfrm>
+            </p:grpSpPr>
+            <p:sp>
+              <p:nvSpPr>
+                <p:cNvPr id="15" name="TextBox 14">
+                  <a:extLst>
+                    <a:ext uri="{FF2B5EF4-FFF2-40B4-BE49-F238E27FC236}">
+                      <a16:creationId xmlns:a16="http://schemas.microsoft.com/office/drawing/2014/main" id="{AD7D8958-8BAD-EF40-83C5-CE2AFC77E22F}"/>
+                    </a:ext>
+                  </a:extLst>
+                </p:cNvPr>
+                <p:cNvSpPr txBox="1"/>
+                <p:nvPr/>
+              </p:nvSpPr>
+              <p:spPr>
+                <a:xfrm>
+                  <a:off x="1129840" y="5786717"/>
+                  <a:ext cx="788998" cy="707885"/>
+                </a:xfrm>
+                <a:prstGeom prst="rect">
+                  <a:avLst/>
+                </a:prstGeom>
+                <a:noFill/>
+              </p:spPr>
+              <p:txBody>
+                <a:bodyPr wrap="none" rtlCol="0">
+                  <a:spAutoFit/>
+                </a:bodyPr>
+                <a:lstStyle/>
+                <a:p>
+                  <a:r>
+                    <a:rPr lang="en-US" sz="4000" dirty="0"/>
+                    <a:t>PO</a:t>
+                  </a:r>
+                </a:p>
+              </p:txBody>
+            </p:sp>
+            <p:cxnSp>
+              <p:nvCxnSpPr>
+                <p:cNvPr id="25" name="Straight Connector 24">
+                  <a:extLst>
+                    <a:ext uri="{FF2B5EF4-FFF2-40B4-BE49-F238E27FC236}">
+                      <a16:creationId xmlns:a16="http://schemas.microsoft.com/office/drawing/2014/main" id="{30452D59-40D0-5A47-B68A-0576C71ADD5F}"/>
+                    </a:ext>
+                  </a:extLst>
+                </p:cNvPr>
+                <p:cNvCxnSpPr>
+                  <a:cxnSpLocks/>
+                </p:cNvCxnSpPr>
+                <p:nvPr/>
+              </p:nvCxnSpPr>
+              <p:spPr>
+                <a:xfrm>
+                  <a:off x="403023" y="6494602"/>
+                  <a:ext cx="2242632" cy="0"/>
+                </a:xfrm>
+                <a:prstGeom prst="line">
+                  <a:avLst/>
+                </a:prstGeom>
+                <a:ln w="57150">
+                  <a:solidFill>
+                    <a:schemeClr val="tx1"/>
+                  </a:solidFill>
+                </a:ln>
+              </p:spPr>
+              <p:style>
+                <a:lnRef idx="1">
+                  <a:schemeClr val="accent1"/>
+                </a:lnRef>
+                <a:fillRef idx="0">
+                  <a:schemeClr val="accent1"/>
+                </a:fillRef>
+                <a:effectRef idx="0">
+                  <a:schemeClr val="accent1"/>
+                </a:effectRef>
+                <a:fontRef idx="minor">
+                  <a:schemeClr val="tx1"/>
+                </a:fontRef>
+              </p:style>
+            </p:cxnSp>
+          </p:grpSp>
+          <p:sp>
+            <p:nvSpPr>
+              <p:cNvPr id="28" name="TextBox 27">
+                <a:extLst>
+                  <a:ext uri="{FF2B5EF4-FFF2-40B4-BE49-F238E27FC236}">
+                    <a16:creationId xmlns:a16="http://schemas.microsoft.com/office/drawing/2014/main" id="{A1A91EC8-9EEC-E343-AF28-0692E20C9D02}"/>
+                  </a:ext>
+                </a:extLst>
+              </p:cNvPr>
+              <p:cNvSpPr txBox="1"/>
+              <p:nvPr/>
+            </p:nvSpPr>
+            <p:spPr>
+              <a:xfrm>
+                <a:off x="3052810" y="5813143"/>
+                <a:ext cx="5957570" cy="707885"/>
+              </a:xfrm>
+              <a:prstGeom prst="rect">
+                <a:avLst/>
+              </a:prstGeom>
+              <a:noFill/>
+            </p:spPr>
+            <p:txBody>
+              <a:bodyPr wrap="square" rtlCol="0">
+                <a:spAutoFit/>
+              </a:bodyPr>
+              <a:lstStyle/>
+              <a:p>
+                <a:r>
+                  <a:rPr lang="en-US" sz="4000" dirty="0"/>
+                  <a:t>Partially Occluded</a:t>
+                </a:r>
+              </a:p>
+            </p:txBody>
+          </p:sp>
+        </p:grpSp>
+        <p:grpSp>
+          <p:nvGrpSpPr>
+            <p:cNvPr id="20" name="Group 19">
+              <a:extLst>
+                <a:ext uri="{FF2B5EF4-FFF2-40B4-BE49-F238E27FC236}">
+                  <a16:creationId xmlns:a16="http://schemas.microsoft.com/office/drawing/2014/main" id="{CA0D49B3-8F60-214B-A778-CFDAC6F925D3}"/>
+                </a:ext>
+              </a:extLst>
+            </p:cNvPr>
+            <p:cNvGrpSpPr/>
+            <p:nvPr/>
+          </p:nvGrpSpPr>
+          <p:grpSpPr>
+            <a:xfrm>
+              <a:off x="403017" y="6812564"/>
+              <a:ext cx="8577832" cy="707886"/>
+              <a:chOff x="403017" y="7454961"/>
+              <a:chExt cx="8577832" cy="707886"/>
+            </a:xfrm>
+          </p:grpSpPr>
+          <p:grpSp>
+            <p:nvGrpSpPr>
+              <p:cNvPr id="18" name="Group 17">
+                <a:extLst>
+                  <a:ext uri="{FF2B5EF4-FFF2-40B4-BE49-F238E27FC236}">
+                    <a16:creationId xmlns:a16="http://schemas.microsoft.com/office/drawing/2014/main" id="{50677D51-CE00-9446-AC9B-1363A348A3A8}"/>
+                  </a:ext>
+                </a:extLst>
+              </p:cNvPr>
+              <p:cNvGrpSpPr/>
+              <p:nvPr/>
+            </p:nvGrpSpPr>
+            <p:grpSpPr>
+              <a:xfrm>
+                <a:off x="403017" y="7454961"/>
+                <a:ext cx="2242632" cy="707886"/>
+                <a:chOff x="403017" y="7442259"/>
+                <a:chExt cx="2242632" cy="707886"/>
+              </a:xfrm>
+            </p:grpSpPr>
+            <p:sp>
+              <p:nvSpPr>
+                <p:cNvPr id="33" name="TextBox 32">
+                  <a:extLst>
+                    <a:ext uri="{FF2B5EF4-FFF2-40B4-BE49-F238E27FC236}">
+                      <a16:creationId xmlns:a16="http://schemas.microsoft.com/office/drawing/2014/main" id="{028F36B6-3632-2341-A347-65C729B27024}"/>
+                    </a:ext>
+                  </a:extLst>
+                </p:cNvPr>
+                <p:cNvSpPr txBox="1"/>
+                <p:nvPr/>
+              </p:nvSpPr>
+              <p:spPr>
+                <a:xfrm>
+                  <a:off x="1262082" y="7442259"/>
+                  <a:ext cx="524503" cy="707886"/>
+                </a:xfrm>
+                <a:prstGeom prst="rect">
+                  <a:avLst/>
+                </a:prstGeom>
+                <a:noFill/>
+              </p:spPr>
+              <p:txBody>
+                <a:bodyPr wrap="none" rtlCol="0">
+                  <a:spAutoFit/>
+                </a:bodyPr>
+                <a:lstStyle/>
+                <a:p>
+                  <a:r>
+                    <a:rPr lang="en-US" sz="4000" dirty="0"/>
+                    <a:t>O</a:t>
+                  </a:r>
+                </a:p>
+              </p:txBody>
+            </p:sp>
+            <p:cxnSp>
+              <p:nvCxnSpPr>
+                <p:cNvPr id="34" name="Straight Connector 33">
+                  <a:extLst>
+                    <a:ext uri="{FF2B5EF4-FFF2-40B4-BE49-F238E27FC236}">
+                      <a16:creationId xmlns:a16="http://schemas.microsoft.com/office/drawing/2014/main" id="{57915017-C6BC-944C-ACC2-15456AA1599C}"/>
+                    </a:ext>
+                  </a:extLst>
+                </p:cNvPr>
+                <p:cNvCxnSpPr>
+                  <a:cxnSpLocks/>
+                </p:cNvCxnSpPr>
+                <p:nvPr/>
+              </p:nvCxnSpPr>
+              <p:spPr>
+                <a:xfrm>
+                  <a:off x="403017" y="8150145"/>
+                  <a:ext cx="2242632" cy="0"/>
+                </a:xfrm>
+                <a:prstGeom prst="line">
+                  <a:avLst/>
+                </a:prstGeom>
+                <a:ln w="57150">
+                  <a:solidFill>
+                    <a:schemeClr val="tx1"/>
+                  </a:solidFill>
+                </a:ln>
+              </p:spPr>
+              <p:style>
+                <a:lnRef idx="1">
+                  <a:schemeClr val="accent1"/>
+                </a:lnRef>
+                <a:fillRef idx="0">
+                  <a:schemeClr val="accent1"/>
+                </a:fillRef>
+                <a:effectRef idx="0">
+                  <a:schemeClr val="accent1"/>
+                </a:effectRef>
+                <a:fontRef idx="minor">
+                  <a:schemeClr val="tx1"/>
+                </a:fontRef>
+              </p:style>
+            </p:cxnSp>
+          </p:grpSp>
+          <p:sp>
+            <p:nvSpPr>
+              <p:cNvPr id="32" name="TextBox 31">
+                <a:extLst>
+                  <a:ext uri="{FF2B5EF4-FFF2-40B4-BE49-F238E27FC236}">
+                    <a16:creationId xmlns:a16="http://schemas.microsoft.com/office/drawing/2014/main" id="{BA3AB6F1-E7BF-8C49-9D03-85B895D8BE29}"/>
+                  </a:ext>
+                </a:extLst>
+              </p:cNvPr>
+              <p:cNvSpPr txBox="1"/>
+              <p:nvPr/>
+            </p:nvSpPr>
+            <p:spPr>
+              <a:xfrm>
+                <a:off x="3023279" y="7454961"/>
+                <a:ext cx="5957570" cy="707886"/>
+              </a:xfrm>
+              <a:prstGeom prst="rect">
+                <a:avLst/>
+              </a:prstGeom>
+              <a:noFill/>
+            </p:spPr>
+            <p:txBody>
+              <a:bodyPr wrap="square" rtlCol="0">
+                <a:spAutoFit/>
+              </a:bodyPr>
+              <a:lstStyle/>
+              <a:p>
+                <a:r>
+                  <a:rPr lang="en-US" sz="4000" dirty="0"/>
+                  <a:t>Occluded</a:t>
+                </a:r>
+              </a:p>
+            </p:txBody>
+          </p:sp>
+        </p:grpSp>
+      </p:grpSp>
+      <p:sp>
+        <p:nvSpPr>
+          <p:cNvPr id="45" name="Rectangle 44">
+            <a:extLst>
+              <a:ext uri="{FF2B5EF4-FFF2-40B4-BE49-F238E27FC236}">
+                <a16:creationId xmlns:a16="http://schemas.microsoft.com/office/drawing/2014/main" id="{1C4B8691-4ADA-B047-8A39-CBE2ED2910D9}"/>
+              </a:ext>
+            </a:extLst>
+          </p:cNvPr>
+          <p:cNvSpPr/>
+          <p:nvPr/>
+        </p:nvSpPr>
+        <p:spPr>
+          <a:xfrm>
+            <a:off x="8211" y="0"/>
+            <a:ext cx="8022606" cy="10405850"/>
+          </a:xfrm>
+          <a:prstGeom prst="rect">
+            <a:avLst/>
+          </a:prstGeom>
+          <a:noFill/>
+        </p:spPr>
+        <p:style>
+          <a:lnRef idx="2">
+            <a:schemeClr val="accent1">
+              <a:shade val="50000"/>
+            </a:schemeClr>
+          </a:lnRef>
+          <a:fillRef idx="1">
+            <a:schemeClr val="accent1"/>
+          </a:fillRef>
+          <a:effectRef idx="0">
+            <a:schemeClr val="accent1"/>
+          </a:effectRef>
+          <a:fontRef idx="minor">
+            <a:schemeClr val="lt1"/>
+          </a:fontRef>
+        </p:style>
+        <p:txBody>
+          <a:bodyPr rtlCol="0" anchor="ctr"/>
+          <a:lstStyle/>
+          <a:p>
+            <a:pPr algn="ctr"/>
+            <a:endParaRPr lang="en-US" sz="9783"/>
+          </a:p>
+        </p:txBody>
+      </p:sp>
+      <p:sp>
+        <p:nvSpPr>
+          <p:cNvPr id="54" name="Rectangle 53">
+            <a:extLst>
+              <a:ext uri="{FF2B5EF4-FFF2-40B4-BE49-F238E27FC236}">
+                <a16:creationId xmlns:a16="http://schemas.microsoft.com/office/drawing/2014/main" id="{3EB59A61-4EBD-B640-94AD-F2FF1D929076}"/>
+              </a:ext>
+            </a:extLst>
+          </p:cNvPr>
+          <p:cNvSpPr/>
+          <p:nvPr/>
+        </p:nvSpPr>
+        <p:spPr>
+          <a:xfrm>
+            <a:off x="8211" y="10405850"/>
+            <a:ext cx="8022606" cy="4527219"/>
+          </a:xfrm>
+          <a:prstGeom prst="rect">
+            <a:avLst/>
+          </a:prstGeom>
+          <a:noFill/>
+        </p:spPr>
+        <p:style>
+          <a:lnRef idx="2">
+            <a:schemeClr val="accent1">
+              <a:shade val="50000"/>
+            </a:schemeClr>
+          </a:lnRef>
+          <a:fillRef idx="1">
+            <a:schemeClr val="accent1"/>
+          </a:fillRef>
+          <a:effectRef idx="0">
+            <a:schemeClr val="accent1"/>
+          </a:effectRef>
+          <a:fontRef idx="minor">
+            <a:schemeClr val="lt1"/>
+          </a:fontRef>
+        </p:style>
+        <p:txBody>
+          <a:bodyPr rtlCol="0" anchor="ctr"/>
+          <a:lstStyle/>
+          <a:p>
+            <a:pPr algn="ctr"/>
+            <a:endParaRPr lang="en-US" sz="9783"/>
+          </a:p>
+        </p:txBody>
+      </p:sp>
+      <p:sp>
+        <p:nvSpPr>
+          <p:cNvPr id="66" name="TextBox 65">
+            <a:extLst>
+              <a:ext uri="{FF2B5EF4-FFF2-40B4-BE49-F238E27FC236}">
+                <a16:creationId xmlns:a16="http://schemas.microsoft.com/office/drawing/2014/main" id="{6FB4D747-7280-8344-B084-EF81C3DAF15A}"/>
+              </a:ext>
+            </a:extLst>
+          </p:cNvPr>
+          <p:cNvSpPr txBox="1"/>
+          <p:nvPr/>
+        </p:nvSpPr>
+        <p:spPr>
+          <a:xfrm>
+            <a:off x="390672" y="370463"/>
+            <a:ext cx="2800062" cy="707886"/>
+          </a:xfrm>
+          <a:prstGeom prst="rect">
+            <a:avLst/>
+          </a:prstGeom>
+          <a:noFill/>
+        </p:spPr>
+        <p:txBody>
+          <a:bodyPr wrap="none" rtlCol="0">
+            <a:spAutoFit/>
+          </a:bodyPr>
+          <a:lstStyle/>
+          <a:p>
+            <a:r>
+              <a:rPr lang="en-US" sz="4000" b="1" dirty="0"/>
+              <a:t>Map Legend</a:t>
+            </a:r>
+          </a:p>
+        </p:txBody>
+      </p:sp>
+      <p:grpSp>
+        <p:nvGrpSpPr>
+          <p:cNvPr id="64" name="Group 63">
+            <a:extLst>
+              <a:ext uri="{FF2B5EF4-FFF2-40B4-BE49-F238E27FC236}">
+                <a16:creationId xmlns:a16="http://schemas.microsoft.com/office/drawing/2014/main" id="{48214F00-01F4-924B-91DE-F9CC6EACCE67}"/>
+              </a:ext>
+            </a:extLst>
+          </p:cNvPr>
+          <p:cNvGrpSpPr/>
+          <p:nvPr/>
+        </p:nvGrpSpPr>
+        <p:grpSpPr>
+          <a:xfrm>
+            <a:off x="269197" y="15400196"/>
+            <a:ext cx="7005613" cy="5783838"/>
+            <a:chOff x="269197" y="15125217"/>
+            <a:chExt cx="7005613" cy="5783838"/>
+          </a:xfrm>
+        </p:grpSpPr>
+        <p:grpSp>
+          <p:nvGrpSpPr>
+            <p:cNvPr id="53" name="Group 52">
+              <a:extLst>
+                <a:ext uri="{FF2B5EF4-FFF2-40B4-BE49-F238E27FC236}">
+                  <a16:creationId xmlns:a16="http://schemas.microsoft.com/office/drawing/2014/main" id="{6BFA95FC-785F-9744-8D2B-C6FE24A14303}"/>
+                </a:ext>
+              </a:extLst>
+            </p:cNvPr>
+            <p:cNvGrpSpPr/>
+            <p:nvPr/>
+          </p:nvGrpSpPr>
+          <p:grpSpPr>
+            <a:xfrm>
+              <a:off x="403026" y="16121293"/>
+              <a:ext cx="5661823" cy="1323439"/>
+              <a:chOff x="403026" y="15801450"/>
+              <a:chExt cx="5661823" cy="1323439"/>
+            </a:xfrm>
+          </p:grpSpPr>
+          <p:sp>
+            <p:nvSpPr>
+              <p:cNvPr id="76" name="TextBox 75">
+                <a:extLst>
+                  <a:ext uri="{FF2B5EF4-FFF2-40B4-BE49-F238E27FC236}">
+                    <a16:creationId xmlns:a16="http://schemas.microsoft.com/office/drawing/2014/main" id="{74DF4AF1-78A0-4644-B156-1885AD4B7611}"/>
+                  </a:ext>
+                </a:extLst>
+              </p:cNvPr>
+              <p:cNvSpPr txBox="1"/>
+              <p:nvPr/>
+            </p:nvSpPr>
+            <p:spPr>
+              <a:xfrm>
+                <a:off x="3049408" y="15801450"/>
+                <a:ext cx="3015441" cy="1323439"/>
+              </a:xfrm>
+              <a:prstGeom prst="rect">
+                <a:avLst/>
+              </a:prstGeom>
+              <a:noFill/>
+            </p:spPr>
+            <p:txBody>
+              <a:bodyPr wrap="none" rtlCol="0">
+                <a:spAutoFit/>
+              </a:bodyPr>
+              <a:lstStyle/>
+              <a:p>
+                <a:r>
+                  <a:rPr lang="en-US" sz="4000" dirty="0"/>
+                  <a:t>Non-intrusive</a:t>
+                </a:r>
+              </a:p>
+              <a:p>
+                <a:r>
+                  <a:rPr lang="en-US" sz="4000" dirty="0"/>
+                  <a:t>(penalty = 0)</a:t>
+                </a:r>
+              </a:p>
+            </p:txBody>
+          </p:sp>
+          <p:grpSp>
+            <p:nvGrpSpPr>
+              <p:cNvPr id="38" name="Group 37">
+                <a:extLst>
+                  <a:ext uri="{FF2B5EF4-FFF2-40B4-BE49-F238E27FC236}">
+                    <a16:creationId xmlns:a16="http://schemas.microsoft.com/office/drawing/2014/main" id="{EAFB6C50-8889-B14B-9B5F-6EFEB82B5AF0}"/>
+                  </a:ext>
+                </a:extLst>
+              </p:cNvPr>
+              <p:cNvGrpSpPr/>
+              <p:nvPr/>
+            </p:nvGrpSpPr>
+            <p:grpSpPr>
+              <a:xfrm>
+                <a:off x="403026" y="16097410"/>
+                <a:ext cx="1981582" cy="731519"/>
+                <a:chOff x="403026" y="16830524"/>
+                <a:chExt cx="1981582" cy="731519"/>
+              </a:xfrm>
+            </p:grpSpPr>
+            <p:sp>
+              <p:nvSpPr>
+                <p:cNvPr id="75" name="Oval 74">
+                  <a:extLst>
+                    <a:ext uri="{FF2B5EF4-FFF2-40B4-BE49-F238E27FC236}">
+                      <a16:creationId xmlns:a16="http://schemas.microsoft.com/office/drawing/2014/main" id="{51F39243-D9AE-0548-A4DB-36B1D2564C29}"/>
+                    </a:ext>
+                  </a:extLst>
+                </p:cNvPr>
+                <p:cNvSpPr>
+                  <a:spLocks noChangeAspect="1"/>
+                </p:cNvSpPr>
+                <p:nvPr/>
+              </p:nvSpPr>
+              <p:spPr>
+                <a:xfrm>
+                  <a:off x="1653089" y="16830524"/>
+                  <a:ext cx="731519" cy="731519"/>
+                </a:xfrm>
+                <a:prstGeom prst="ellipse">
+                  <a:avLst/>
+                </a:prstGeom>
+                <a:solidFill>
+                  <a:srgbClr val="00B050"/>
+                </a:solidFill>
+                <a:ln>
+                  <a:solidFill>
+                    <a:schemeClr val="tx1"/>
+                  </a:solidFill>
+                </a:ln>
+              </p:spPr>
+              <p:style>
+                <a:lnRef idx="2">
+                  <a:schemeClr val="accent1">
+                    <a:shade val="50000"/>
+                  </a:schemeClr>
+                </a:lnRef>
+                <a:fillRef idx="1">
+                  <a:schemeClr val="accent1"/>
+                </a:fillRef>
+                <a:effectRef idx="0">
+                  <a:schemeClr val="accent1"/>
+                </a:effectRef>
+                <a:fontRef idx="minor">
+                  <a:schemeClr val="lt1"/>
+                </a:fontRef>
+              </p:style>
+              <p:txBody>
+                <a:bodyPr rtlCol="0" anchor="ctr"/>
+                <a:lstStyle/>
+                <a:p>
+                  <a:pPr algn="ctr"/>
+                  <a:endParaRPr lang="en-US" sz="9783" dirty="0"/>
+                </a:p>
+              </p:txBody>
+            </p:sp>
+            <p:cxnSp>
+              <p:nvCxnSpPr>
+                <p:cNvPr id="78" name="Straight Arrow Connector 77">
+                  <a:extLst>
+                    <a:ext uri="{FF2B5EF4-FFF2-40B4-BE49-F238E27FC236}">
+                      <a16:creationId xmlns:a16="http://schemas.microsoft.com/office/drawing/2014/main" id="{70CEC18C-56C8-3D47-B3AE-3F85DEDA82C6}"/>
+                    </a:ext>
+                  </a:extLst>
+                </p:cNvPr>
+                <p:cNvCxnSpPr>
+                  <a:cxnSpLocks/>
+                </p:cNvCxnSpPr>
+                <p:nvPr/>
+              </p:nvCxnSpPr>
+              <p:spPr>
+                <a:xfrm flipV="1">
+                  <a:off x="403026" y="17188483"/>
+                  <a:ext cx="1250063" cy="15600"/>
+                </a:xfrm>
+                <a:prstGeom prst="straightConnector1">
+                  <a:avLst/>
+                </a:prstGeom>
+                <a:ln w="19050">
+                  <a:solidFill>
+                    <a:schemeClr val="tx1"/>
+                  </a:solidFill>
+                  <a:headEnd type="none" w="med" len="med"/>
+                  <a:tailEnd type="arrow" w="med" len="med"/>
+                </a:ln>
+              </p:spPr>
+              <p:style>
+                <a:lnRef idx="1">
+                  <a:schemeClr val="accent1"/>
+                </a:lnRef>
+                <a:fillRef idx="0">
+                  <a:schemeClr val="accent1"/>
+                </a:fillRef>
+                <a:effectRef idx="0">
+                  <a:schemeClr val="accent1"/>
+                </a:effectRef>
+                <a:fontRef idx="minor">
+                  <a:schemeClr val="tx1"/>
+                </a:fontRef>
+              </p:style>
+            </p:cxnSp>
+          </p:grpSp>
+        </p:grpSp>
+        <p:grpSp>
+          <p:nvGrpSpPr>
+            <p:cNvPr id="55" name="Group 54">
+              <a:extLst>
+                <a:ext uri="{FF2B5EF4-FFF2-40B4-BE49-F238E27FC236}">
+                  <a16:creationId xmlns:a16="http://schemas.microsoft.com/office/drawing/2014/main" id="{DD8FAE53-4295-DE42-895E-A3A11577CA3D}"/>
+                </a:ext>
+              </a:extLst>
+            </p:cNvPr>
+            <p:cNvGrpSpPr/>
+            <p:nvPr/>
+          </p:nvGrpSpPr>
+          <p:grpSpPr>
+            <a:xfrm>
+              <a:off x="403026" y="17853454"/>
+              <a:ext cx="6871784" cy="1323439"/>
+              <a:chOff x="403026" y="17522525"/>
+              <a:chExt cx="6871784" cy="1323439"/>
+            </a:xfrm>
+          </p:grpSpPr>
+          <p:sp>
+            <p:nvSpPr>
+              <p:cNvPr id="74" name="TextBox 73">
+                <a:extLst>
+                  <a:ext uri="{FF2B5EF4-FFF2-40B4-BE49-F238E27FC236}">
+                    <a16:creationId xmlns:a16="http://schemas.microsoft.com/office/drawing/2014/main" id="{63C3C0B8-497D-1845-B214-B4F93F1510E8}"/>
+                  </a:ext>
+                </a:extLst>
+              </p:cNvPr>
+              <p:cNvSpPr txBox="1"/>
+              <p:nvPr/>
+            </p:nvSpPr>
+            <p:spPr>
+              <a:xfrm>
+                <a:off x="2955358" y="17522525"/>
+                <a:ext cx="4319452" cy="1323439"/>
+              </a:xfrm>
+              <a:prstGeom prst="rect">
+                <a:avLst/>
+              </a:prstGeom>
+              <a:noFill/>
+            </p:spPr>
+            <p:txBody>
+              <a:bodyPr wrap="none" rtlCol="0">
+                <a:spAutoFit/>
+              </a:bodyPr>
+              <a:lstStyle/>
+              <a:p>
+                <a:r>
+                  <a:rPr lang="en-US" sz="4000" dirty="0"/>
+                  <a:t>Somewhat intrusive</a:t>
+                </a:r>
+              </a:p>
+              <a:p>
+                <a:r>
+                  <a:rPr lang="en-US" sz="4000" dirty="0"/>
+                  <a:t>(penalty = 1)</a:t>
+                </a:r>
+              </a:p>
+            </p:txBody>
+          </p:sp>
+          <p:grpSp>
+            <p:nvGrpSpPr>
+              <p:cNvPr id="40" name="Group 39">
+                <a:extLst>
+                  <a:ext uri="{FF2B5EF4-FFF2-40B4-BE49-F238E27FC236}">
+                    <a16:creationId xmlns:a16="http://schemas.microsoft.com/office/drawing/2014/main" id="{16553180-E161-0846-B122-CFF655F76F16}"/>
+                  </a:ext>
+                </a:extLst>
+              </p:cNvPr>
+              <p:cNvGrpSpPr/>
+              <p:nvPr/>
+            </p:nvGrpSpPr>
+            <p:grpSpPr>
+              <a:xfrm>
+                <a:off x="403026" y="17849440"/>
+                <a:ext cx="1981582" cy="731519"/>
+                <a:chOff x="403026" y="18390763"/>
+                <a:chExt cx="1981582" cy="731519"/>
+              </a:xfrm>
+            </p:grpSpPr>
+            <p:sp>
+              <p:nvSpPr>
+                <p:cNvPr id="73" name="Oval 72">
+                  <a:extLst>
+                    <a:ext uri="{FF2B5EF4-FFF2-40B4-BE49-F238E27FC236}">
+                      <a16:creationId xmlns:a16="http://schemas.microsoft.com/office/drawing/2014/main" id="{4A04137D-4489-EB4F-9AC1-41682FBF869F}"/>
+                    </a:ext>
+                  </a:extLst>
+                </p:cNvPr>
+                <p:cNvSpPr>
+                  <a:spLocks noChangeAspect="1"/>
+                </p:cNvSpPr>
+                <p:nvPr/>
+              </p:nvSpPr>
+              <p:spPr>
+                <a:xfrm>
+                  <a:off x="1653089" y="18390763"/>
+                  <a:ext cx="731519" cy="731519"/>
+                </a:xfrm>
+                <a:prstGeom prst="ellipse">
+                  <a:avLst/>
+                </a:prstGeom>
+                <a:solidFill>
+                  <a:srgbClr val="FFFF00"/>
+                </a:solidFill>
+                <a:ln>
+                  <a:solidFill>
+                    <a:schemeClr val="tx1"/>
+                  </a:solidFill>
+                </a:ln>
+              </p:spPr>
+              <p:style>
+                <a:lnRef idx="2">
+                  <a:schemeClr val="accent1">
+                    <a:shade val="50000"/>
+                  </a:schemeClr>
+                </a:lnRef>
+                <a:fillRef idx="1">
+                  <a:schemeClr val="accent1"/>
+                </a:fillRef>
+                <a:effectRef idx="0">
+                  <a:schemeClr val="accent1"/>
+                </a:effectRef>
+                <a:fontRef idx="minor">
+                  <a:schemeClr val="lt1"/>
+                </a:fontRef>
+              </p:style>
+              <p:txBody>
+                <a:bodyPr rtlCol="0" anchor="ctr"/>
+                <a:lstStyle/>
+                <a:p>
+                  <a:pPr algn="ctr"/>
+                  <a:endParaRPr lang="en-US" sz="9783"/>
+                </a:p>
+              </p:txBody>
+            </p:sp>
+            <p:cxnSp>
+              <p:nvCxnSpPr>
+                <p:cNvPr id="82" name="Straight Arrow Connector 81">
+                  <a:extLst>
+                    <a:ext uri="{FF2B5EF4-FFF2-40B4-BE49-F238E27FC236}">
+                      <a16:creationId xmlns:a16="http://schemas.microsoft.com/office/drawing/2014/main" id="{D55D52F0-5C24-E842-A5BC-62205A798758}"/>
+                    </a:ext>
+                  </a:extLst>
+                </p:cNvPr>
+                <p:cNvCxnSpPr>
+                  <a:cxnSpLocks/>
+                </p:cNvCxnSpPr>
+                <p:nvPr/>
+              </p:nvCxnSpPr>
+              <p:spPr>
+                <a:xfrm>
+                  <a:off x="403026" y="18756522"/>
+                  <a:ext cx="1250063" cy="0"/>
+                </a:xfrm>
+                <a:prstGeom prst="straightConnector1">
+                  <a:avLst/>
+                </a:prstGeom>
+                <a:ln w="19050">
+                  <a:solidFill>
+                    <a:schemeClr val="tx1"/>
+                  </a:solidFill>
+                  <a:headEnd type="none" w="med" len="med"/>
+                  <a:tailEnd type="arrow" w="med" len="med"/>
+                </a:ln>
+              </p:spPr>
+              <p:style>
+                <a:lnRef idx="1">
+                  <a:schemeClr val="accent1"/>
+                </a:lnRef>
+                <a:fillRef idx="0">
+                  <a:schemeClr val="accent1"/>
+                </a:fillRef>
+                <a:effectRef idx="0">
+                  <a:schemeClr val="accent1"/>
+                </a:effectRef>
+                <a:fontRef idx="minor">
+                  <a:schemeClr val="tx1"/>
+                </a:fontRef>
+              </p:style>
+            </p:cxnSp>
+          </p:grpSp>
+        </p:grpSp>
+        <p:grpSp>
+          <p:nvGrpSpPr>
+            <p:cNvPr id="57" name="Group 56">
+              <a:extLst>
+                <a:ext uri="{FF2B5EF4-FFF2-40B4-BE49-F238E27FC236}">
+                  <a16:creationId xmlns:a16="http://schemas.microsoft.com/office/drawing/2014/main" id="{5FFF9152-4239-5945-93D2-4EEBDB74D83B}"/>
+                </a:ext>
+              </a:extLst>
+            </p:cNvPr>
+            <p:cNvGrpSpPr/>
+            <p:nvPr/>
+          </p:nvGrpSpPr>
+          <p:grpSpPr>
+            <a:xfrm>
+              <a:off x="403026" y="19585616"/>
+              <a:ext cx="5526367" cy="1323439"/>
+              <a:chOff x="403026" y="19305508"/>
+              <a:chExt cx="5526367" cy="1323439"/>
+            </a:xfrm>
+          </p:grpSpPr>
+          <p:sp>
+            <p:nvSpPr>
+              <p:cNvPr id="72" name="TextBox 71">
+                <a:extLst>
+                  <a:ext uri="{FF2B5EF4-FFF2-40B4-BE49-F238E27FC236}">
+                    <a16:creationId xmlns:a16="http://schemas.microsoft.com/office/drawing/2014/main" id="{BAE916FA-9979-DA4F-8AF8-0A2FAE3CFC6F}"/>
+                  </a:ext>
+                </a:extLst>
+              </p:cNvPr>
+              <p:cNvSpPr txBox="1"/>
+              <p:nvPr/>
+            </p:nvSpPr>
+            <p:spPr>
+              <a:xfrm>
+                <a:off x="2892087" y="19305508"/>
+                <a:ext cx="3037306" cy="1323439"/>
+              </a:xfrm>
+              <a:prstGeom prst="rect">
+                <a:avLst/>
+              </a:prstGeom>
+              <a:noFill/>
+            </p:spPr>
+            <p:txBody>
+              <a:bodyPr wrap="none" rtlCol="0">
+                <a:spAutoFit/>
+              </a:bodyPr>
+              <a:lstStyle/>
+              <a:p>
+                <a:r>
+                  <a:rPr lang="en-US" sz="4000" dirty="0"/>
+                  <a:t>Very intrusive</a:t>
+                </a:r>
+              </a:p>
+              <a:p>
+                <a:r>
+                  <a:rPr lang="en-US" sz="4000" dirty="0"/>
+                  <a:t>(penalty = 3)</a:t>
+                </a:r>
+              </a:p>
+            </p:txBody>
+          </p:sp>
+          <p:grpSp>
+            <p:nvGrpSpPr>
+              <p:cNvPr id="41" name="Group 40">
+                <a:extLst>
+                  <a:ext uri="{FF2B5EF4-FFF2-40B4-BE49-F238E27FC236}">
+                    <a16:creationId xmlns:a16="http://schemas.microsoft.com/office/drawing/2014/main" id="{F914461D-91D3-144E-A921-9A9D3465D1F2}"/>
+                  </a:ext>
+                </a:extLst>
+              </p:cNvPr>
+              <p:cNvGrpSpPr/>
+              <p:nvPr/>
+            </p:nvGrpSpPr>
+            <p:grpSpPr>
+              <a:xfrm>
+                <a:off x="403026" y="19601469"/>
+                <a:ext cx="1981582" cy="731519"/>
+                <a:chOff x="403026" y="19951002"/>
+                <a:chExt cx="1981582" cy="731519"/>
+              </a:xfrm>
+            </p:grpSpPr>
+            <p:sp>
+              <p:nvSpPr>
+                <p:cNvPr id="71" name="Oval 70">
+                  <a:extLst>
+                    <a:ext uri="{FF2B5EF4-FFF2-40B4-BE49-F238E27FC236}">
+                      <a16:creationId xmlns:a16="http://schemas.microsoft.com/office/drawing/2014/main" id="{C4BBEB8F-2B00-6948-AE2C-CA29263C1A47}"/>
+                    </a:ext>
+                  </a:extLst>
+                </p:cNvPr>
+                <p:cNvSpPr>
+                  <a:spLocks noChangeAspect="1"/>
+                </p:cNvSpPr>
+                <p:nvPr/>
+              </p:nvSpPr>
+              <p:spPr>
+                <a:xfrm>
+                  <a:off x="1653089" y="19951002"/>
+                  <a:ext cx="731519" cy="731519"/>
+                </a:xfrm>
+                <a:prstGeom prst="ellipse">
+                  <a:avLst/>
+                </a:prstGeom>
+                <a:solidFill>
+                  <a:srgbClr val="FF0000"/>
+                </a:solidFill>
+                <a:ln>
+                  <a:solidFill>
+                    <a:schemeClr val="tx1"/>
+                  </a:solidFill>
+                </a:ln>
+              </p:spPr>
+              <p:style>
+                <a:lnRef idx="2">
+                  <a:schemeClr val="accent1">
+                    <a:shade val="50000"/>
+                  </a:schemeClr>
+                </a:lnRef>
+                <a:fillRef idx="1">
+                  <a:schemeClr val="accent1"/>
+                </a:fillRef>
+                <a:effectRef idx="0">
+                  <a:schemeClr val="accent1"/>
+                </a:effectRef>
+                <a:fontRef idx="minor">
+                  <a:schemeClr val="lt1"/>
+                </a:fontRef>
+              </p:style>
+              <p:txBody>
+                <a:bodyPr rtlCol="0" anchor="ctr"/>
+                <a:lstStyle/>
+                <a:p>
+                  <a:pPr algn="ctr"/>
+                  <a:endParaRPr lang="en-US" sz="9783"/>
+                </a:p>
+              </p:txBody>
+            </p:sp>
+            <p:cxnSp>
+              <p:nvCxnSpPr>
+                <p:cNvPr id="83" name="Straight Arrow Connector 82">
+                  <a:extLst>
+                    <a:ext uri="{FF2B5EF4-FFF2-40B4-BE49-F238E27FC236}">
+                      <a16:creationId xmlns:a16="http://schemas.microsoft.com/office/drawing/2014/main" id="{4D9BCFC8-346F-AD47-9D31-E55AAF0F8055}"/>
+                    </a:ext>
+                  </a:extLst>
+                </p:cNvPr>
+                <p:cNvCxnSpPr>
+                  <a:cxnSpLocks/>
+                </p:cNvCxnSpPr>
+                <p:nvPr/>
+              </p:nvCxnSpPr>
+              <p:spPr>
+                <a:xfrm>
+                  <a:off x="403026" y="20316761"/>
+                  <a:ext cx="1250063" cy="0"/>
+                </a:xfrm>
+                <a:prstGeom prst="straightConnector1">
+                  <a:avLst/>
+                </a:prstGeom>
+                <a:ln w="19050">
+                  <a:solidFill>
+                    <a:schemeClr val="tx1"/>
+                  </a:solidFill>
+                  <a:headEnd type="none" w="med" len="med"/>
+                  <a:tailEnd type="arrow" w="med" len="med"/>
+                </a:ln>
+              </p:spPr>
+              <p:style>
+                <a:lnRef idx="1">
+                  <a:schemeClr val="accent1"/>
+                </a:lnRef>
+                <a:fillRef idx="0">
+                  <a:schemeClr val="accent1"/>
+                </a:fillRef>
+                <a:effectRef idx="0">
+                  <a:schemeClr val="accent1"/>
+                </a:effectRef>
+                <a:fontRef idx="minor">
+                  <a:schemeClr val="tx1"/>
+                </a:fontRef>
+              </p:style>
+            </p:cxnSp>
+          </p:grpSp>
+        </p:grpSp>
+        <p:sp>
+          <p:nvSpPr>
+            <p:cNvPr id="86" name="TextBox 85">
+              <a:extLst>
+                <a:ext uri="{FF2B5EF4-FFF2-40B4-BE49-F238E27FC236}">
+                  <a16:creationId xmlns:a16="http://schemas.microsoft.com/office/drawing/2014/main" id="{4A634C9B-F483-8D4F-8218-48C6544E6853}"/>
+                </a:ext>
+              </a:extLst>
+            </p:cNvPr>
+            <p:cNvSpPr txBox="1"/>
+            <p:nvPr/>
+          </p:nvSpPr>
+          <p:spPr>
+            <a:xfrm>
+              <a:off x="269197" y="15125217"/>
+              <a:ext cx="2999667" cy="707886"/>
+            </a:xfrm>
+            <a:prstGeom prst="rect">
+              <a:avLst/>
+            </a:prstGeom>
+            <a:noFill/>
+          </p:spPr>
+          <p:txBody>
+            <a:bodyPr wrap="none" rtlCol="0">
+              <a:spAutoFit/>
+            </a:bodyPr>
+            <a:lstStyle/>
+            <a:p>
+              <a:r>
+                <a:rPr lang="en-US" sz="4000" b="1" dirty="0"/>
+                <a:t>Intrusiveness</a:t>
+              </a:r>
+            </a:p>
+          </p:txBody>
+        </p:sp>
+      </p:grpSp>
+      <p:grpSp>
+        <p:nvGrpSpPr>
+          <p:cNvPr id="67" name="Group 66">
+            <a:extLst>
+              <a:ext uri="{FF2B5EF4-FFF2-40B4-BE49-F238E27FC236}">
+                <a16:creationId xmlns:a16="http://schemas.microsoft.com/office/drawing/2014/main" id="{3B0E48D4-8388-6E4E-ABBA-3927C6C2366C}"/>
+              </a:ext>
+            </a:extLst>
+          </p:cNvPr>
+          <p:cNvGrpSpPr/>
+          <p:nvPr/>
+        </p:nvGrpSpPr>
+        <p:grpSpPr>
+          <a:xfrm>
+            <a:off x="254896" y="10885656"/>
+            <a:ext cx="8755483" cy="3094626"/>
+            <a:chOff x="254896" y="10720644"/>
+            <a:chExt cx="8755483" cy="3094626"/>
+          </a:xfrm>
+        </p:grpSpPr>
+        <p:sp>
+          <p:nvSpPr>
+            <p:cNvPr id="52" name="TextBox 51">
+              <a:extLst>
+                <a:ext uri="{FF2B5EF4-FFF2-40B4-BE49-F238E27FC236}">
+                  <a16:creationId xmlns:a16="http://schemas.microsoft.com/office/drawing/2014/main" id="{2FD81C80-2BE7-4340-9F60-2052DE773701}"/>
+                </a:ext>
+              </a:extLst>
+            </p:cNvPr>
+            <p:cNvSpPr txBox="1"/>
+            <p:nvPr/>
+          </p:nvSpPr>
+          <p:spPr>
+            <a:xfrm>
+              <a:off x="254896" y="10720644"/>
+              <a:ext cx="3130987" cy="707884"/>
+            </a:xfrm>
+            <a:prstGeom prst="rect">
+              <a:avLst/>
+            </a:prstGeom>
+            <a:noFill/>
+          </p:spPr>
+          <p:txBody>
+            <a:bodyPr wrap="none" rtlCol="0">
+              <a:spAutoFit/>
+            </a:bodyPr>
+            <a:lstStyle/>
+            <a:p>
+              <a:r>
+                <a:rPr lang="en-US" sz="4000" b="1" dirty="0"/>
+                <a:t>Driving Speed</a:t>
+              </a:r>
+            </a:p>
+          </p:txBody>
+        </p:sp>
+        <p:grpSp>
+          <p:nvGrpSpPr>
+            <p:cNvPr id="36" name="Group 35">
+              <a:extLst>
+                <a:ext uri="{FF2B5EF4-FFF2-40B4-BE49-F238E27FC236}">
+                  <a16:creationId xmlns:a16="http://schemas.microsoft.com/office/drawing/2014/main" id="{E5B2A883-9AB7-9444-9195-FF4924804414}"/>
+                </a:ext>
+              </a:extLst>
+            </p:cNvPr>
+            <p:cNvGrpSpPr/>
+            <p:nvPr/>
+          </p:nvGrpSpPr>
+          <p:grpSpPr>
+            <a:xfrm>
+              <a:off x="403017" y="11896624"/>
+              <a:ext cx="8607362" cy="707885"/>
+              <a:chOff x="403017" y="12261608"/>
+              <a:chExt cx="8607362" cy="707885"/>
+            </a:xfrm>
+          </p:grpSpPr>
+          <p:sp>
+            <p:nvSpPr>
+              <p:cNvPr id="47" name="TextBox 46">
+                <a:extLst>
+                  <a:ext uri="{FF2B5EF4-FFF2-40B4-BE49-F238E27FC236}">
+                    <a16:creationId xmlns:a16="http://schemas.microsoft.com/office/drawing/2014/main" id="{3FFDB115-732A-6D4B-BF6A-7AFFCFF3BD18}"/>
+                  </a:ext>
+                </a:extLst>
+              </p:cNvPr>
+              <p:cNvSpPr txBox="1"/>
+              <p:nvPr/>
+            </p:nvSpPr>
+            <p:spPr>
+              <a:xfrm>
+                <a:off x="3052809" y="12261608"/>
+                <a:ext cx="5957570" cy="707885"/>
+              </a:xfrm>
+              <a:prstGeom prst="rect">
+                <a:avLst/>
+              </a:prstGeom>
+              <a:noFill/>
+            </p:spPr>
+            <p:txBody>
+              <a:bodyPr wrap="square" rtlCol="0">
+                <a:spAutoFit/>
+              </a:bodyPr>
+              <a:lstStyle/>
+              <a:p>
+                <a:r>
+                  <a:rPr lang="en-US" sz="4000" dirty="0"/>
+                  <a:t>0.35 meter/second</a:t>
+                </a:r>
+              </a:p>
+            </p:txBody>
+          </p:sp>
+          <p:sp>
+            <p:nvSpPr>
+              <p:cNvPr id="35" name="Rectangle 34">
+                <a:extLst>
+                  <a:ext uri="{FF2B5EF4-FFF2-40B4-BE49-F238E27FC236}">
+                    <a16:creationId xmlns:a16="http://schemas.microsoft.com/office/drawing/2014/main" id="{9DEE01F7-62C5-5F40-BD47-148FF8CC9A53}"/>
+                  </a:ext>
+                </a:extLst>
+              </p:cNvPr>
+              <p:cNvSpPr/>
+              <p:nvPr/>
+            </p:nvSpPr>
+            <p:spPr>
+              <a:xfrm>
+                <a:off x="403017" y="12524110"/>
+                <a:ext cx="2240280" cy="182880"/>
+              </a:xfrm>
+              <a:prstGeom prst="rect">
+                <a:avLst/>
+              </a:prstGeom>
+              <a:solidFill>
+                <a:srgbClr val="00B0F0"/>
+              </a:solidFill>
+              <a:ln>
+                <a:noFill/>
+              </a:ln>
+            </p:spPr>
+            <p:style>
+              <a:lnRef idx="2">
+                <a:schemeClr val="accent1">
+                  <a:shade val="50000"/>
+                </a:schemeClr>
+              </a:lnRef>
+              <a:fillRef idx="1">
+                <a:schemeClr val="accent1"/>
+              </a:fillRef>
+              <a:effectRef idx="0">
+                <a:schemeClr val="accent1"/>
+              </a:effectRef>
+              <a:fontRef idx="minor">
+                <a:schemeClr val="lt1"/>
+              </a:fontRef>
+            </p:style>
+            <p:txBody>
+              <a:bodyPr rtlCol="0" anchor="ctr"/>
+              <a:lstStyle/>
+              <a:p>
+                <a:pPr algn="ctr"/>
+                <a:endParaRPr lang="en-US"/>
+              </a:p>
+            </p:txBody>
+          </p:sp>
+        </p:grpSp>
+        <p:grpSp>
+          <p:nvGrpSpPr>
+            <p:cNvPr id="37" name="Group 36">
+              <a:extLst>
+                <a:ext uri="{FF2B5EF4-FFF2-40B4-BE49-F238E27FC236}">
+                  <a16:creationId xmlns:a16="http://schemas.microsoft.com/office/drawing/2014/main" id="{110E8E47-0344-624A-B43A-CC9F56B54E3D}"/>
+                </a:ext>
+              </a:extLst>
+            </p:cNvPr>
+            <p:cNvGrpSpPr/>
+            <p:nvPr/>
+          </p:nvGrpSpPr>
+          <p:grpSpPr>
+            <a:xfrm>
+              <a:off x="403017" y="13107384"/>
+              <a:ext cx="8603961" cy="707886"/>
+              <a:chOff x="403017" y="13535837"/>
+              <a:chExt cx="8603961" cy="707886"/>
+            </a:xfrm>
+          </p:grpSpPr>
+          <p:sp>
+            <p:nvSpPr>
+              <p:cNvPr id="51" name="TextBox 50">
+                <a:extLst>
+                  <a:ext uri="{FF2B5EF4-FFF2-40B4-BE49-F238E27FC236}">
+                    <a16:creationId xmlns:a16="http://schemas.microsoft.com/office/drawing/2014/main" id="{14D340DE-445D-AB4E-AE40-6E2A26C8B1D9}"/>
+                  </a:ext>
+                </a:extLst>
+              </p:cNvPr>
+              <p:cNvSpPr txBox="1"/>
+              <p:nvPr/>
+            </p:nvSpPr>
+            <p:spPr>
+              <a:xfrm>
+                <a:off x="3049408" y="13535837"/>
+                <a:ext cx="5957570" cy="707886"/>
+              </a:xfrm>
+              <a:prstGeom prst="rect">
+                <a:avLst/>
+              </a:prstGeom>
+              <a:noFill/>
+            </p:spPr>
+            <p:txBody>
+              <a:bodyPr wrap="square" rtlCol="0">
+                <a:spAutoFit/>
+              </a:bodyPr>
+              <a:lstStyle/>
+              <a:p>
+                <a:r>
+                  <a:rPr lang="en-US" sz="4000" dirty="0"/>
+                  <a:t>0.68 meter/second</a:t>
+                </a:r>
+              </a:p>
+            </p:txBody>
+          </p:sp>
+          <p:sp>
+            <p:nvSpPr>
+              <p:cNvPr id="105" name="Rectangle 104">
+                <a:extLst>
+                  <a:ext uri="{FF2B5EF4-FFF2-40B4-BE49-F238E27FC236}">
+                    <a16:creationId xmlns:a16="http://schemas.microsoft.com/office/drawing/2014/main" id="{C84D5C96-2000-5140-89C5-A12B3D2CD6B9}"/>
+                  </a:ext>
+                </a:extLst>
+              </p:cNvPr>
+              <p:cNvSpPr/>
+              <p:nvPr/>
+            </p:nvSpPr>
+            <p:spPr>
+              <a:xfrm>
+                <a:off x="403017" y="13798340"/>
+                <a:ext cx="2240280" cy="182880"/>
+              </a:xfrm>
+              <a:prstGeom prst="rect">
+                <a:avLst/>
+              </a:prstGeom>
+              <a:solidFill>
+                <a:schemeClr val="accent1">
+                  <a:lumMod val="75000"/>
+                </a:schemeClr>
+              </a:solidFill>
+              <a:ln>
+                <a:noFill/>
+              </a:ln>
+            </p:spPr>
+            <p:style>
+              <a:lnRef idx="2">
+                <a:schemeClr val="accent1">
+                  <a:shade val="50000"/>
+                </a:schemeClr>
+              </a:lnRef>
+              <a:fillRef idx="1">
+                <a:schemeClr val="accent1"/>
+              </a:fillRef>
+              <a:effectRef idx="0">
+                <a:schemeClr val="accent1"/>
+              </a:effectRef>
+              <a:fontRef idx="minor">
+                <a:schemeClr val="lt1"/>
+              </a:fontRef>
+            </p:style>
+            <p:txBody>
+              <a:bodyPr rtlCol="0" anchor="ctr"/>
+              <a:lstStyle/>
+              <a:p>
+                <a:pPr algn="ctr"/>
+                <a:endParaRPr lang="en-US"/>
+              </a:p>
+            </p:txBody>
+          </p:sp>
+        </p:grpSp>
+      </p:grpSp>
+      <p:grpSp>
+        <p:nvGrpSpPr>
+          <p:cNvPr id="65" name="Group 64">
+            <a:extLst>
+              <a:ext uri="{FF2B5EF4-FFF2-40B4-BE49-F238E27FC236}">
+                <a16:creationId xmlns:a16="http://schemas.microsoft.com/office/drawing/2014/main" id="{E3478DC2-D08E-7A40-A390-0EFF9FC069F5}"/>
+              </a:ext>
+            </a:extLst>
+          </p:cNvPr>
+          <p:cNvGrpSpPr/>
+          <p:nvPr/>
+        </p:nvGrpSpPr>
+        <p:grpSpPr>
+          <a:xfrm>
+            <a:off x="254896" y="22236598"/>
+            <a:ext cx="8755484" cy="5333805"/>
+            <a:chOff x="254896" y="22105205"/>
+            <a:chExt cx="8755484" cy="5333805"/>
+          </a:xfrm>
+        </p:grpSpPr>
+        <p:sp>
+          <p:nvSpPr>
+            <p:cNvPr id="88" name="TextBox 87">
+              <a:extLst>
+                <a:ext uri="{FF2B5EF4-FFF2-40B4-BE49-F238E27FC236}">
+                  <a16:creationId xmlns:a16="http://schemas.microsoft.com/office/drawing/2014/main" id="{9C6ACCC2-4E04-9A4B-9809-88340FCC83AD}"/>
+                </a:ext>
+              </a:extLst>
+            </p:cNvPr>
+            <p:cNvSpPr txBox="1"/>
+            <p:nvPr/>
+          </p:nvSpPr>
+          <p:spPr>
+            <a:xfrm>
+              <a:off x="254896" y="22105205"/>
+              <a:ext cx="1994457" cy="707886"/>
+            </a:xfrm>
+            <a:prstGeom prst="rect">
+              <a:avLst/>
+            </a:prstGeom>
+            <a:noFill/>
+          </p:spPr>
+          <p:txBody>
+            <a:bodyPr wrap="none" rtlCol="0">
+              <a:spAutoFit/>
+            </a:bodyPr>
+            <a:lstStyle/>
+            <a:p>
+              <a:r>
+                <a:rPr lang="en-US" sz="4000" b="1" dirty="0"/>
+                <a:t>Collision</a:t>
+              </a:r>
+            </a:p>
+          </p:txBody>
+        </p:sp>
+        <p:grpSp>
+          <p:nvGrpSpPr>
+            <p:cNvPr id="61" name="Group 60">
+              <a:extLst>
+                <a:ext uri="{FF2B5EF4-FFF2-40B4-BE49-F238E27FC236}">
+                  <a16:creationId xmlns:a16="http://schemas.microsoft.com/office/drawing/2014/main" id="{718A9D57-9508-984C-A9C6-6C0C871E4816}"/>
+                </a:ext>
+              </a:extLst>
+            </p:cNvPr>
+            <p:cNvGrpSpPr/>
+            <p:nvPr/>
+          </p:nvGrpSpPr>
+          <p:grpSpPr>
+            <a:xfrm>
+              <a:off x="403017" y="23167034"/>
+              <a:ext cx="8595014" cy="862542"/>
+              <a:chOff x="403017" y="22855622"/>
+              <a:chExt cx="8595014" cy="862542"/>
+            </a:xfrm>
+          </p:grpSpPr>
+          <p:sp>
+            <p:nvSpPr>
+              <p:cNvPr id="97" name="TextBox 96">
+                <a:extLst>
+                  <a:ext uri="{FF2B5EF4-FFF2-40B4-BE49-F238E27FC236}">
+                    <a16:creationId xmlns:a16="http://schemas.microsoft.com/office/drawing/2014/main" id="{C1962A8C-28A2-2545-B17E-A45080F95C7B}"/>
+                  </a:ext>
+                </a:extLst>
+              </p:cNvPr>
+              <p:cNvSpPr txBox="1"/>
+              <p:nvPr/>
+            </p:nvSpPr>
+            <p:spPr>
+              <a:xfrm>
+                <a:off x="3040460" y="22932950"/>
+                <a:ext cx="5957571" cy="707886"/>
+              </a:xfrm>
+              <a:prstGeom prst="rect">
+                <a:avLst/>
+              </a:prstGeom>
+              <a:noFill/>
+            </p:spPr>
+            <p:txBody>
+              <a:bodyPr wrap="square" rtlCol="0">
+                <a:spAutoFit/>
+              </a:bodyPr>
+              <a:lstStyle/>
+              <a:p>
+                <a:r>
+                  <a:rPr lang="en-US" sz="4000" dirty="0"/>
+                  <a:t>No collision</a:t>
+                </a:r>
+              </a:p>
+            </p:txBody>
+          </p:sp>
+          <p:grpSp>
+            <p:nvGrpSpPr>
+              <p:cNvPr id="59" name="Group 58">
+                <a:extLst>
+                  <a:ext uri="{FF2B5EF4-FFF2-40B4-BE49-F238E27FC236}">
+                    <a16:creationId xmlns:a16="http://schemas.microsoft.com/office/drawing/2014/main" id="{77FA584C-4330-E74A-B68F-63D7716A98D9}"/>
+                  </a:ext>
+                </a:extLst>
+              </p:cNvPr>
+              <p:cNvGrpSpPr/>
+              <p:nvPr/>
+            </p:nvGrpSpPr>
+            <p:grpSpPr>
+              <a:xfrm>
+                <a:off x="403017" y="22855622"/>
+                <a:ext cx="2240280" cy="862542"/>
+                <a:chOff x="403017" y="22882158"/>
+                <a:chExt cx="2240280" cy="862542"/>
+              </a:xfrm>
+            </p:grpSpPr>
+            <p:sp>
+              <p:nvSpPr>
+                <p:cNvPr id="89" name="TextBox 88">
+                  <a:extLst>
+                    <a:ext uri="{FF2B5EF4-FFF2-40B4-BE49-F238E27FC236}">
+                      <a16:creationId xmlns:a16="http://schemas.microsoft.com/office/drawing/2014/main" id="{164E0D14-1E1C-754F-9C7E-F382FF62C770}"/>
+                    </a:ext>
+                  </a:extLst>
+                </p:cNvPr>
+                <p:cNvSpPr txBox="1"/>
+                <p:nvPr/>
+              </p:nvSpPr>
+              <p:spPr>
+                <a:xfrm>
+                  <a:off x="1271326" y="22882158"/>
+                  <a:ext cx="503663" cy="862542"/>
+                </a:xfrm>
+                <a:prstGeom prst="rect">
+                  <a:avLst/>
+                </a:prstGeom>
+                <a:noFill/>
+              </p:spPr>
+              <p:txBody>
+                <a:bodyPr wrap="none" rtlCol="0">
+                  <a:spAutoFit/>
+                </a:bodyPr>
+                <a:lstStyle/>
+                <a:p>
+                  <a:r>
+                    <a:rPr lang="en-US" sz="5005" dirty="0"/>
+                    <a:t>*</a:t>
+                  </a:r>
+                </a:p>
+              </p:txBody>
+            </p:sp>
+            <p:sp>
+              <p:nvSpPr>
+                <p:cNvPr id="119" name="Rectangle 118">
+                  <a:extLst>
+                    <a:ext uri="{FF2B5EF4-FFF2-40B4-BE49-F238E27FC236}">
+                      <a16:creationId xmlns:a16="http://schemas.microsoft.com/office/drawing/2014/main" id="{24D4FF98-FDB6-A045-97AE-5A16010FB26E}"/>
+                    </a:ext>
+                  </a:extLst>
+                </p:cNvPr>
+                <p:cNvSpPr/>
+                <p:nvPr/>
+              </p:nvSpPr>
+              <p:spPr>
+                <a:xfrm>
+                  <a:off x="403017" y="23561820"/>
+                  <a:ext cx="2240280" cy="182880"/>
+                </a:xfrm>
+                <a:prstGeom prst="rect">
+                  <a:avLst/>
+                </a:prstGeom>
+                <a:solidFill>
+                  <a:srgbClr val="00B0F0"/>
+                </a:solidFill>
+                <a:ln>
+                  <a:noFill/>
+                </a:ln>
+              </p:spPr>
+              <p:style>
+                <a:lnRef idx="2">
+                  <a:schemeClr val="accent1">
+                    <a:shade val="50000"/>
+                  </a:schemeClr>
+                </a:lnRef>
+                <a:fillRef idx="1">
+                  <a:schemeClr val="accent1"/>
+                </a:fillRef>
+                <a:effectRef idx="0">
+                  <a:schemeClr val="accent1"/>
+                </a:effectRef>
+                <a:fontRef idx="minor">
+                  <a:schemeClr val="lt1"/>
+                </a:fontRef>
+              </p:style>
+              <p:txBody>
+                <a:bodyPr rtlCol="0" anchor="ctr"/>
+                <a:lstStyle/>
+                <a:p>
+                  <a:pPr algn="ctr"/>
+                  <a:endParaRPr lang="en-US"/>
+                </a:p>
+              </p:txBody>
+            </p:sp>
+          </p:grpSp>
+        </p:grpSp>
+        <p:grpSp>
+          <p:nvGrpSpPr>
+            <p:cNvPr id="62" name="Group 61">
+              <a:extLst>
+                <a:ext uri="{FF2B5EF4-FFF2-40B4-BE49-F238E27FC236}">
+                  <a16:creationId xmlns:a16="http://schemas.microsoft.com/office/drawing/2014/main" id="{96CBD84F-DC2C-D842-B1A9-B0C58A2F3B3D}"/>
+                </a:ext>
+              </a:extLst>
+            </p:cNvPr>
+            <p:cNvGrpSpPr/>
+            <p:nvPr/>
+          </p:nvGrpSpPr>
+          <p:grpSpPr>
+            <a:xfrm>
+              <a:off x="390672" y="24746794"/>
+              <a:ext cx="8619708" cy="987499"/>
+              <a:chOff x="390672" y="24523333"/>
+              <a:chExt cx="8619708" cy="987499"/>
+            </a:xfrm>
+          </p:grpSpPr>
+          <p:sp>
+            <p:nvSpPr>
+              <p:cNvPr id="95" name="TextBox 94">
+                <a:extLst>
+                  <a:ext uri="{FF2B5EF4-FFF2-40B4-BE49-F238E27FC236}">
+                    <a16:creationId xmlns:a16="http://schemas.microsoft.com/office/drawing/2014/main" id="{B5F5B7DB-A5CD-D744-9400-E43551E5C535}"/>
+                  </a:ext>
+                </a:extLst>
+              </p:cNvPr>
+              <p:cNvSpPr txBox="1"/>
+              <p:nvPr/>
+            </p:nvSpPr>
+            <p:spPr>
+              <a:xfrm>
+                <a:off x="3052809" y="24663139"/>
+                <a:ext cx="5957571" cy="707886"/>
+              </a:xfrm>
+              <a:prstGeom prst="rect">
+                <a:avLst/>
+              </a:prstGeom>
+              <a:noFill/>
+            </p:spPr>
+            <p:txBody>
+              <a:bodyPr wrap="square" rtlCol="0">
+                <a:spAutoFit/>
+              </a:bodyPr>
+              <a:lstStyle/>
+              <a:p>
+                <a:r>
+                  <a:rPr lang="en-US" sz="4000" dirty="0"/>
+                  <a:t>0.2 expected collision</a:t>
+                </a:r>
+              </a:p>
+            </p:txBody>
+          </p:sp>
+          <p:grpSp>
+            <p:nvGrpSpPr>
+              <p:cNvPr id="60" name="Group 59">
+                <a:extLst>
+                  <a:ext uri="{FF2B5EF4-FFF2-40B4-BE49-F238E27FC236}">
+                    <a16:creationId xmlns:a16="http://schemas.microsoft.com/office/drawing/2014/main" id="{942EF61F-1444-CD4D-8BB2-6BDF02CB3D5F}"/>
+                  </a:ext>
+                </a:extLst>
+              </p:cNvPr>
+              <p:cNvGrpSpPr/>
+              <p:nvPr/>
+            </p:nvGrpSpPr>
+            <p:grpSpPr>
+              <a:xfrm>
+                <a:off x="390672" y="24523333"/>
+                <a:ext cx="2240280" cy="987499"/>
+                <a:chOff x="390672" y="24523333"/>
+                <a:chExt cx="2240280" cy="987499"/>
+              </a:xfrm>
+            </p:grpSpPr>
+            <p:sp>
+              <p:nvSpPr>
+                <p:cNvPr id="93" name="TextBox 92">
+                  <a:extLst>
+                    <a:ext uri="{FF2B5EF4-FFF2-40B4-BE49-F238E27FC236}">
+                      <a16:creationId xmlns:a16="http://schemas.microsoft.com/office/drawing/2014/main" id="{84B89F41-D8AE-EA41-B9C8-11402E3E6A2E}"/>
+                    </a:ext>
+                  </a:extLst>
+                </p:cNvPr>
+                <p:cNvSpPr txBox="1"/>
+                <p:nvPr/>
+              </p:nvSpPr>
+              <p:spPr>
+                <a:xfrm>
+                  <a:off x="1040170" y="24523333"/>
+                  <a:ext cx="941284" cy="862542"/>
+                </a:xfrm>
+                <a:prstGeom prst="rect">
+                  <a:avLst/>
+                </a:prstGeom>
+                <a:noFill/>
+              </p:spPr>
+              <p:txBody>
+                <a:bodyPr wrap="none" rtlCol="0">
+                  <a:spAutoFit/>
+                </a:bodyPr>
+                <a:lstStyle/>
+                <a:p>
+                  <a:r>
+                    <a:rPr lang="en-US" sz="5005" dirty="0"/>
+                    <a:t>PO</a:t>
+                  </a:r>
+                </a:p>
+              </p:txBody>
+            </p:sp>
+            <p:sp>
+              <p:nvSpPr>
+                <p:cNvPr id="120" name="Rectangle 119">
+                  <a:extLst>
+                    <a:ext uri="{FF2B5EF4-FFF2-40B4-BE49-F238E27FC236}">
+                      <a16:creationId xmlns:a16="http://schemas.microsoft.com/office/drawing/2014/main" id="{FF40AFD2-0D49-644A-9673-53158F9E47D4}"/>
+                    </a:ext>
+                  </a:extLst>
+                </p:cNvPr>
+                <p:cNvSpPr/>
+                <p:nvPr/>
+              </p:nvSpPr>
+              <p:spPr>
+                <a:xfrm>
+                  <a:off x="390672" y="25327952"/>
+                  <a:ext cx="2240280" cy="182880"/>
+                </a:xfrm>
+                <a:prstGeom prst="rect">
+                  <a:avLst/>
+                </a:prstGeom>
+                <a:solidFill>
+                  <a:schemeClr val="accent1">
+                    <a:lumMod val="75000"/>
+                  </a:schemeClr>
+                </a:solidFill>
+                <a:ln>
+                  <a:noFill/>
+                </a:ln>
+              </p:spPr>
+              <p:style>
+                <a:lnRef idx="2">
+                  <a:schemeClr val="accent1">
+                    <a:shade val="50000"/>
+                  </a:schemeClr>
+                </a:lnRef>
+                <a:fillRef idx="1">
+                  <a:schemeClr val="accent1"/>
+                </a:fillRef>
+                <a:effectRef idx="0">
+                  <a:schemeClr val="accent1"/>
+                </a:effectRef>
+                <a:fontRef idx="minor">
+                  <a:schemeClr val="lt1"/>
+                </a:fontRef>
+              </p:style>
+              <p:txBody>
+                <a:bodyPr rtlCol="0" anchor="ctr"/>
+                <a:lstStyle/>
+                <a:p>
+                  <a:pPr algn="ctr"/>
+                  <a:endParaRPr lang="en-US"/>
+                </a:p>
+              </p:txBody>
+            </p:sp>
+          </p:grpSp>
+        </p:grpSp>
+        <p:grpSp>
+          <p:nvGrpSpPr>
+            <p:cNvPr id="63" name="Group 62">
+              <a:extLst>
+                <a:ext uri="{FF2B5EF4-FFF2-40B4-BE49-F238E27FC236}">
+                  <a16:creationId xmlns:a16="http://schemas.microsoft.com/office/drawing/2014/main" id="{304F28D4-556E-9C41-811A-01A0B318A641}"/>
+                </a:ext>
+              </a:extLst>
+            </p:cNvPr>
+            <p:cNvGrpSpPr/>
+            <p:nvPr/>
+          </p:nvGrpSpPr>
+          <p:grpSpPr>
+            <a:xfrm>
+              <a:off x="390672" y="26451511"/>
+              <a:ext cx="8607359" cy="987499"/>
+              <a:chOff x="390672" y="26074891"/>
+              <a:chExt cx="8607359" cy="987499"/>
+            </a:xfrm>
+          </p:grpSpPr>
+          <p:sp>
+            <p:nvSpPr>
+              <p:cNvPr id="102" name="TextBox 101">
+                <a:extLst>
+                  <a:ext uri="{FF2B5EF4-FFF2-40B4-BE49-F238E27FC236}">
+                    <a16:creationId xmlns:a16="http://schemas.microsoft.com/office/drawing/2014/main" id="{DC329B82-1178-4B47-91A1-FCDA89EA6E0E}"/>
+                  </a:ext>
+                </a:extLst>
+              </p:cNvPr>
+              <p:cNvSpPr txBox="1"/>
+              <p:nvPr/>
+            </p:nvSpPr>
+            <p:spPr>
+              <a:xfrm>
+                <a:off x="3040460" y="26214697"/>
+                <a:ext cx="5957571" cy="707886"/>
+              </a:xfrm>
+              <a:prstGeom prst="rect">
+                <a:avLst/>
+              </a:prstGeom>
+              <a:noFill/>
+            </p:spPr>
+            <p:txBody>
+              <a:bodyPr wrap="square" rtlCol="0">
+                <a:spAutoFit/>
+              </a:bodyPr>
+              <a:lstStyle/>
+              <a:p>
+                <a:r>
+                  <a:rPr lang="en-US" sz="4000" dirty="0"/>
+                  <a:t>0.4 expected collision</a:t>
+                </a:r>
+              </a:p>
+            </p:txBody>
+          </p:sp>
+          <p:grpSp>
+            <p:nvGrpSpPr>
+              <p:cNvPr id="122" name="Group 121">
+                <a:extLst>
+                  <a:ext uri="{FF2B5EF4-FFF2-40B4-BE49-F238E27FC236}">
+                    <a16:creationId xmlns:a16="http://schemas.microsoft.com/office/drawing/2014/main" id="{71E0EDC1-E7DD-684B-860C-37CFCBC2AF1B}"/>
+                  </a:ext>
+                </a:extLst>
+              </p:cNvPr>
+              <p:cNvGrpSpPr/>
+              <p:nvPr/>
+            </p:nvGrpSpPr>
+            <p:grpSpPr>
+              <a:xfrm>
+                <a:off x="390672" y="26074891"/>
+                <a:ext cx="2240280" cy="987499"/>
+                <a:chOff x="390672" y="24523333"/>
+                <a:chExt cx="2240280" cy="987499"/>
+              </a:xfrm>
+            </p:grpSpPr>
+            <p:sp>
+              <p:nvSpPr>
+                <p:cNvPr id="123" name="TextBox 122">
+                  <a:extLst>
+                    <a:ext uri="{FF2B5EF4-FFF2-40B4-BE49-F238E27FC236}">
+                      <a16:creationId xmlns:a16="http://schemas.microsoft.com/office/drawing/2014/main" id="{F57B4BA6-B9CE-3148-A448-0B5D06104427}"/>
+                    </a:ext>
+                  </a:extLst>
+                </p:cNvPr>
+                <p:cNvSpPr txBox="1"/>
+                <p:nvPr/>
+              </p:nvSpPr>
+              <p:spPr>
+                <a:xfrm>
+                  <a:off x="1206081" y="24523333"/>
+                  <a:ext cx="609462" cy="862544"/>
+                </a:xfrm>
+                <a:prstGeom prst="rect">
+                  <a:avLst/>
+                </a:prstGeom>
+                <a:noFill/>
+              </p:spPr>
+              <p:txBody>
+                <a:bodyPr wrap="none" rtlCol="0">
+                  <a:spAutoFit/>
+                </a:bodyPr>
+                <a:lstStyle/>
+                <a:p>
+                  <a:r>
+                    <a:rPr lang="en-US" sz="5005" dirty="0"/>
+                    <a:t>O</a:t>
+                  </a:r>
+                </a:p>
+              </p:txBody>
+            </p:sp>
+            <p:sp>
+              <p:nvSpPr>
+                <p:cNvPr id="124" name="Rectangle 123">
+                  <a:extLst>
+                    <a:ext uri="{FF2B5EF4-FFF2-40B4-BE49-F238E27FC236}">
+                      <a16:creationId xmlns:a16="http://schemas.microsoft.com/office/drawing/2014/main" id="{76B61ACD-29D5-A34F-BC9E-DDEA9D6CD80C}"/>
+                    </a:ext>
+                  </a:extLst>
+                </p:cNvPr>
+                <p:cNvSpPr/>
+                <p:nvPr/>
+              </p:nvSpPr>
+              <p:spPr>
+                <a:xfrm>
+                  <a:off x="390672" y="25327952"/>
+                  <a:ext cx="2240280" cy="182880"/>
+                </a:xfrm>
+                <a:prstGeom prst="rect">
+                  <a:avLst/>
+                </a:prstGeom>
+                <a:solidFill>
+                  <a:schemeClr val="accent1">
+                    <a:lumMod val="75000"/>
+                  </a:schemeClr>
+                </a:solidFill>
+                <a:ln>
+                  <a:noFill/>
+                </a:ln>
+              </p:spPr>
+              <p:style>
+                <a:lnRef idx="2">
+                  <a:schemeClr val="accent1">
+                    <a:shade val="50000"/>
+                  </a:schemeClr>
+                </a:lnRef>
+                <a:fillRef idx="1">
+                  <a:schemeClr val="accent1"/>
+                </a:fillRef>
+                <a:effectRef idx="0">
+                  <a:schemeClr val="accent1"/>
+                </a:effectRef>
+                <a:fontRef idx="minor">
+                  <a:schemeClr val="lt1"/>
+                </a:fontRef>
+              </p:style>
+              <p:txBody>
+                <a:bodyPr rtlCol="0" anchor="ctr"/>
+                <a:lstStyle/>
+                <a:p>
+                  <a:pPr algn="ctr"/>
+                  <a:endParaRPr lang="en-US"/>
+                </a:p>
+              </p:txBody>
+            </p:sp>
+          </p:grpSp>
+        </p:grpSp>
+      </p:grpSp>
+      <p:grpSp>
+        <p:nvGrpSpPr>
+          <p:cNvPr id="27" name="Group 26">
+            <a:extLst>
+              <a:ext uri="{FF2B5EF4-FFF2-40B4-BE49-F238E27FC236}">
+                <a16:creationId xmlns:a16="http://schemas.microsoft.com/office/drawing/2014/main" id="{E7483E49-7876-3C47-AB4A-59DA576C9CD3}"/>
+              </a:ext>
+            </a:extLst>
+          </p:cNvPr>
+          <p:cNvGrpSpPr/>
+          <p:nvPr/>
+        </p:nvGrpSpPr>
+        <p:grpSpPr>
+          <a:xfrm>
+            <a:off x="1439909" y="8551279"/>
+            <a:ext cx="5159210" cy="1165105"/>
+            <a:chOff x="1326174" y="8383509"/>
+            <a:chExt cx="5159210" cy="1165105"/>
+          </a:xfrm>
+        </p:grpSpPr>
+        <p:sp>
+          <p:nvSpPr>
+            <p:cNvPr id="85" name="TextBox 84">
+              <a:extLst>
+                <a:ext uri="{FF2B5EF4-FFF2-40B4-BE49-F238E27FC236}">
+                  <a16:creationId xmlns:a16="http://schemas.microsoft.com/office/drawing/2014/main" id="{264026A1-15D6-AD4E-A434-8599D3B355B6}"/>
+                </a:ext>
+              </a:extLst>
+            </p:cNvPr>
+            <p:cNvSpPr txBox="1"/>
+            <p:nvPr/>
+          </p:nvSpPr>
+          <p:spPr>
+            <a:xfrm>
+              <a:off x="2703879" y="8383509"/>
+              <a:ext cx="2403800" cy="707886"/>
+            </a:xfrm>
+            <a:prstGeom prst="rect">
+              <a:avLst/>
+            </a:prstGeom>
+            <a:noFill/>
+          </p:spPr>
+          <p:txBody>
+            <a:bodyPr wrap="none" rtlCol="0">
+              <a:spAutoFit/>
+            </a:bodyPr>
+            <a:lstStyle/>
+            <a:p>
+              <a:pPr algn="r"/>
+              <a:r>
+                <a:rPr lang="en-US" sz="4000" dirty="0"/>
+                <a:t>3.5 meters</a:t>
+              </a:r>
+            </a:p>
+          </p:txBody>
+        </p:sp>
+        <p:grpSp>
+          <p:nvGrpSpPr>
+            <p:cNvPr id="22" name="Group 21">
+              <a:extLst>
+                <a:ext uri="{FF2B5EF4-FFF2-40B4-BE49-F238E27FC236}">
+                  <a16:creationId xmlns:a16="http://schemas.microsoft.com/office/drawing/2014/main" id="{23D1066A-8CEB-954C-8625-958D583A6655}"/>
+                </a:ext>
+              </a:extLst>
+            </p:cNvPr>
+            <p:cNvGrpSpPr/>
+            <p:nvPr/>
+          </p:nvGrpSpPr>
+          <p:grpSpPr>
+            <a:xfrm>
+              <a:off x="1326174" y="8634196"/>
+              <a:ext cx="5159210" cy="914418"/>
+              <a:chOff x="1750308" y="8249032"/>
+              <a:chExt cx="5159210" cy="914418"/>
+            </a:xfrm>
+          </p:grpSpPr>
+          <p:sp>
+            <p:nvSpPr>
+              <p:cNvPr id="87" name="Oval 86">
+                <a:extLst>
+                  <a:ext uri="{FF2B5EF4-FFF2-40B4-BE49-F238E27FC236}">
+                    <a16:creationId xmlns:a16="http://schemas.microsoft.com/office/drawing/2014/main" id="{9AE33E9F-CC0F-0546-80A0-8C7FB9B50B14}"/>
+                  </a:ext>
+                </a:extLst>
+              </p:cNvPr>
+              <p:cNvSpPr>
+                <a:spLocks noChangeAspect="1"/>
+              </p:cNvSpPr>
+              <p:nvPr/>
+            </p:nvSpPr>
+            <p:spPr>
+              <a:xfrm>
+                <a:off x="1750308" y="8249032"/>
+                <a:ext cx="914400" cy="914418"/>
+              </a:xfrm>
+              <a:prstGeom prst="ellipse">
+                <a:avLst/>
+              </a:prstGeom>
+              <a:solidFill>
+                <a:schemeClr val="bg2"/>
+              </a:solidFill>
+              <a:ln>
+                <a:solidFill>
+                  <a:schemeClr val="tx1"/>
+                </a:solidFill>
+              </a:ln>
+            </p:spPr>
+            <p:style>
+              <a:lnRef idx="2">
+                <a:schemeClr val="accent1">
+                  <a:shade val="50000"/>
+                </a:schemeClr>
+              </a:lnRef>
+              <a:fillRef idx="1">
+                <a:schemeClr val="accent1"/>
+              </a:fillRef>
+              <a:effectRef idx="0">
+                <a:schemeClr val="accent1"/>
+              </a:effectRef>
+              <a:fontRef idx="minor">
+                <a:schemeClr val="lt1"/>
+              </a:fontRef>
+            </p:style>
+            <p:txBody>
+              <a:bodyPr rtlCol="0" anchor="ctr"/>
+              <a:lstStyle/>
+              <a:p>
+                <a:pPr algn="ctr"/>
+                <a:r>
+                  <a:rPr lang="en-US" sz="3800" dirty="0">
+                    <a:solidFill>
+                      <a:schemeClr val="tx1"/>
+                    </a:solidFill>
+                  </a:rPr>
+                  <a:t>L1</a:t>
+                </a:r>
+              </a:p>
+            </p:txBody>
+          </p:sp>
+          <p:sp>
+            <p:nvSpPr>
+              <p:cNvPr id="90" name="Oval 89">
+                <a:extLst>
+                  <a:ext uri="{FF2B5EF4-FFF2-40B4-BE49-F238E27FC236}">
+                    <a16:creationId xmlns:a16="http://schemas.microsoft.com/office/drawing/2014/main" id="{C7C74CC9-BE41-FC4D-8608-04CC0307363C}"/>
+                  </a:ext>
+                </a:extLst>
+              </p:cNvPr>
+              <p:cNvSpPr>
+                <a:spLocks noChangeAspect="1"/>
+              </p:cNvSpPr>
+              <p:nvPr/>
+            </p:nvSpPr>
+            <p:spPr>
+              <a:xfrm>
+                <a:off x="5995136" y="8249032"/>
+                <a:ext cx="914382" cy="914400"/>
+              </a:xfrm>
+              <a:prstGeom prst="ellipse">
+                <a:avLst/>
+              </a:prstGeom>
+              <a:solidFill>
+                <a:schemeClr val="bg2"/>
+              </a:solidFill>
+              <a:ln>
+                <a:solidFill>
+                  <a:schemeClr val="tx1"/>
+                </a:solidFill>
+              </a:ln>
+            </p:spPr>
+            <p:style>
+              <a:lnRef idx="2">
+                <a:schemeClr val="accent1">
+                  <a:shade val="50000"/>
+                </a:schemeClr>
+              </a:lnRef>
+              <a:fillRef idx="1">
+                <a:schemeClr val="accent1"/>
+              </a:fillRef>
+              <a:effectRef idx="0">
+                <a:schemeClr val="accent1"/>
+              </a:effectRef>
+              <a:fontRef idx="minor">
+                <a:schemeClr val="lt1"/>
+              </a:fontRef>
+            </p:style>
+            <p:txBody>
+              <a:bodyPr rtlCol="0" anchor="ctr"/>
+              <a:lstStyle/>
+              <a:p>
+                <a:pPr algn="ctr"/>
+                <a:r>
+                  <a:rPr lang="en-US" sz="3800" dirty="0">
+                    <a:solidFill>
+                      <a:schemeClr val="tx1"/>
+                    </a:solidFill>
+                  </a:rPr>
+                  <a:t>L2</a:t>
+                </a:r>
+              </a:p>
+            </p:txBody>
+          </p:sp>
+          <p:cxnSp>
+            <p:nvCxnSpPr>
+              <p:cNvPr id="16" name="Straight Connector 15">
+                <a:extLst>
+                  <a:ext uri="{FF2B5EF4-FFF2-40B4-BE49-F238E27FC236}">
+                    <a16:creationId xmlns:a16="http://schemas.microsoft.com/office/drawing/2014/main" id="{E16166E3-A5D9-0745-9D13-2685AFBBD092}"/>
+                  </a:ext>
+                </a:extLst>
+              </p:cNvPr>
+              <p:cNvCxnSpPr>
+                <a:stCxn id="87" idx="6"/>
+                <a:endCxn id="90" idx="2"/>
+              </p:cNvCxnSpPr>
+              <p:nvPr/>
+            </p:nvCxnSpPr>
+            <p:spPr>
+              <a:xfrm flipV="1">
+                <a:off x="2664708" y="8706232"/>
+                <a:ext cx="3330428" cy="9"/>
+              </a:xfrm>
+              <a:prstGeom prst="line">
+                <a:avLst/>
+              </a:prstGeom>
+              <a:ln>
+                <a:solidFill>
+                  <a:schemeClr val="tx1"/>
+                </a:solidFill>
+              </a:ln>
+            </p:spPr>
+            <p:style>
+              <a:lnRef idx="1">
+                <a:schemeClr val="accent1"/>
+              </a:lnRef>
+              <a:fillRef idx="0">
+                <a:schemeClr val="accent1"/>
+              </a:fillRef>
+              <a:effectRef idx="0">
+                <a:schemeClr val="accent1"/>
+              </a:effectRef>
+              <a:fontRef idx="minor">
+                <a:schemeClr val="tx1"/>
+              </a:fontRef>
+            </p:style>
+          </p:cxnSp>
+        </p:grpSp>
+      </p:grpSp>
+    </p:spTree>
+    <p:extLst>
+      <p:ext uri="{BB962C8B-B14F-4D97-AF65-F5344CB8AC3E}">
+        <p14:creationId xmlns:p14="http://schemas.microsoft.com/office/powerpoint/2010/main" val="3254603408"/>
+      </p:ext>
+    </p:extLst>
+  </p:cSld>
+  <p:clrMapOvr>
+    <a:masterClrMapping/>
+  </p:clrMapOvr>
+</p:sld>
+</file>
+
+<file path=ppt/slides/slide2.xml><?xml version="1.0" encoding="utf-8"?>
 <p:sld xmlns:a="http://schemas.openxmlformats.org/drawingml/2006/main" xmlns:r="http://schemas.openxmlformats.org/officeDocument/2006/relationships" xmlns:p="http://schemas.openxmlformats.org/presentationml/2006/main">
   <p:cSld>
     <p:spTree>
@@ -5806,7 +8383,7 @@
     </p:spTree>
     <p:extLst>
       <p:ext uri="{BB962C8B-B14F-4D97-AF65-F5344CB8AC3E}">
-        <p14:creationId xmlns:p14="http://schemas.microsoft.com/office/powerpoint/2010/main" val="3254603408"/>
+        <p14:creationId xmlns:p14="http://schemas.microsoft.com/office/powerpoint/2010/main" val="3435671339"/>
       </p:ext>
     </p:extLst>
   </p:cSld>
@@ -5816,7 +8393,7 @@
 </p:sld>
 </file>
 
-<file path=ppt/slides/slide2.xml><?xml version="1.0" encoding="utf-8"?>
+<file path=ppt/slides/slide3.xml><?xml version="1.0" encoding="utf-8"?>
 <p:sld xmlns:a="http://schemas.openxmlformats.org/drawingml/2006/main" xmlns:r="http://schemas.openxmlformats.org/officeDocument/2006/relationships" xmlns:p="http://schemas.openxmlformats.org/presentationml/2006/main">
   <p:cSld>
     <p:spTree>

</xml_diff>

<commit_message>
Minor update on legend
</commit_message>
<xml_diff>
--- a/XPlanningEvaluation/data/legend.pptx
+++ b/XPlanningEvaluation/data/legend.pptx
@@ -4016,7 +4016,7 @@
                 <a:prstGeom prst="straightConnector1">
                   <a:avLst/>
                 </a:prstGeom>
-                <a:ln w="19050">
+                <a:ln w="57150">
                   <a:solidFill>
                     <a:schemeClr val="tx1"/>
                   </a:solidFill>
@@ -4200,7 +4200,7 @@
                 <a:prstGeom prst="straightConnector1">
                   <a:avLst/>
                 </a:prstGeom>
-                <a:ln w="19050">
+                <a:ln w="57150">
                   <a:solidFill>
                     <a:schemeClr val="tx1"/>
                   </a:solidFill>
@@ -4384,7 +4384,7 @@
                 <a:prstGeom prst="straightConnector1">
                   <a:avLst/>
                 </a:prstGeom>
-                <a:ln w="19050">
+                <a:ln w="57150">
                   <a:solidFill>
                     <a:schemeClr val="tx1"/>
                   </a:solidFill>
@@ -5496,7 +5496,7 @@
               <a:prstGeom prst="line">
                 <a:avLst/>
               </a:prstGeom>
-              <a:ln>
+              <a:ln w="57150">
                 <a:solidFill>
                   <a:schemeClr val="tx1"/>
                 </a:solidFill>
@@ -6592,7 +6592,7 @@
                 <a:prstGeom prst="straightConnector1">
                   <a:avLst/>
                 </a:prstGeom>
-                <a:ln w="19050">
+                <a:ln w="57150">
                   <a:solidFill>
                     <a:schemeClr val="tx1"/>
                   </a:solidFill>
@@ -6776,7 +6776,7 @@
                 <a:prstGeom prst="straightConnector1">
                   <a:avLst/>
                 </a:prstGeom>
-                <a:ln w="19050">
+                <a:ln w="57150">
                   <a:solidFill>
                     <a:schemeClr val="tx1"/>
                   </a:solidFill>
@@ -6960,7 +6960,7 @@
                 <a:prstGeom prst="straightConnector1">
                   <a:avLst/>
                 </a:prstGeom>
-                <a:ln w="19050">
+                <a:ln w="57150">
                   <a:solidFill>
                     <a:schemeClr val="tx1"/>
                   </a:solidFill>

</xml_diff>